<commit_message>
make figure ord static style
</commit_message>
<xml_diff>
--- a/schematics.pptx
+++ b/schematics.pptx
@@ -109,6 +109,11 @@
       </a:defRPr>
     </a:lvl9pPr>
   </p:defaultTextStyle>
+  <p:extLst>
+    <p:ext uri="{EFAFB233-063F-42B5-8137-9DF3F51BA10A}">
+      <p15:sldGuideLst xmlns:p15="http://schemas.microsoft.com/office/powerpoint/2012/main"/>
+    </p:ext>
+  </p:extLst>
 </p:presentation>
 </file>
 
@@ -194,7 +199,7 @@
           <a:p>
             <a:fld id="{A61E3D00-5EC2-F042-AB36-2E24F3D0F16F}" type="datetimeFigureOut">
               <a:rPr lang="en-US" smtClean="0"/>
-              <a:t>1/16/25</a:t>
+              <a:t>1/19/25</a:t>
             </a:fld>
             <a:endParaRPr lang="en-US"/>
           </a:p>
@@ -863,7 +868,7 @@
           <a:p>
             <a:fld id="{18A68141-A2A4-914E-926C-C562912FDC7F}" type="datetimeFigureOut">
               <a:rPr lang="en-US" smtClean="0"/>
-              <a:t>1/16/25</a:t>
+              <a:t>1/19/25</a:t>
             </a:fld>
             <a:endParaRPr lang="en-US"/>
           </a:p>
@@ -1063,7 +1068,7 @@
           <a:p>
             <a:fld id="{18A68141-A2A4-914E-926C-C562912FDC7F}" type="datetimeFigureOut">
               <a:rPr lang="en-US" smtClean="0"/>
-              <a:t>1/16/25</a:t>
+              <a:t>1/19/25</a:t>
             </a:fld>
             <a:endParaRPr lang="en-US"/>
           </a:p>
@@ -1273,7 +1278,7 @@
           <a:p>
             <a:fld id="{18A68141-A2A4-914E-926C-C562912FDC7F}" type="datetimeFigureOut">
               <a:rPr lang="en-US" smtClean="0"/>
-              <a:t>1/16/25</a:t>
+              <a:t>1/19/25</a:t>
             </a:fld>
             <a:endParaRPr lang="en-US"/>
           </a:p>
@@ -1473,7 +1478,7 @@
           <a:p>
             <a:fld id="{18A68141-A2A4-914E-926C-C562912FDC7F}" type="datetimeFigureOut">
               <a:rPr lang="en-US" smtClean="0"/>
-              <a:t>1/16/25</a:t>
+              <a:t>1/19/25</a:t>
             </a:fld>
             <a:endParaRPr lang="en-US"/>
           </a:p>
@@ -1749,7 +1754,7 @@
           <a:p>
             <a:fld id="{18A68141-A2A4-914E-926C-C562912FDC7F}" type="datetimeFigureOut">
               <a:rPr lang="en-US" smtClean="0"/>
-              <a:t>1/16/25</a:t>
+              <a:t>1/19/25</a:t>
             </a:fld>
             <a:endParaRPr lang="en-US"/>
           </a:p>
@@ -2017,7 +2022,7 @@
           <a:p>
             <a:fld id="{18A68141-A2A4-914E-926C-C562912FDC7F}" type="datetimeFigureOut">
               <a:rPr lang="en-US" smtClean="0"/>
-              <a:t>1/16/25</a:t>
+              <a:t>1/19/25</a:t>
             </a:fld>
             <a:endParaRPr lang="en-US"/>
           </a:p>
@@ -2432,7 +2437,7 @@
           <a:p>
             <a:fld id="{18A68141-A2A4-914E-926C-C562912FDC7F}" type="datetimeFigureOut">
               <a:rPr lang="en-US" smtClean="0"/>
-              <a:t>1/16/25</a:t>
+              <a:t>1/19/25</a:t>
             </a:fld>
             <a:endParaRPr lang="en-US"/>
           </a:p>
@@ -2574,7 +2579,7 @@
           <a:p>
             <a:fld id="{18A68141-A2A4-914E-926C-C562912FDC7F}" type="datetimeFigureOut">
               <a:rPr lang="en-US" smtClean="0"/>
-              <a:t>1/16/25</a:t>
+              <a:t>1/19/25</a:t>
             </a:fld>
             <a:endParaRPr lang="en-US"/>
           </a:p>
@@ -2687,7 +2692,7 @@
           <a:p>
             <a:fld id="{18A68141-A2A4-914E-926C-C562912FDC7F}" type="datetimeFigureOut">
               <a:rPr lang="en-US" smtClean="0"/>
-              <a:t>1/16/25</a:t>
+              <a:t>1/19/25</a:t>
             </a:fld>
             <a:endParaRPr lang="en-US"/>
           </a:p>
@@ -3000,7 +3005,7 @@
           <a:p>
             <a:fld id="{18A68141-A2A4-914E-926C-C562912FDC7F}" type="datetimeFigureOut">
               <a:rPr lang="en-US" smtClean="0"/>
-              <a:t>1/16/25</a:t>
+              <a:t>1/19/25</a:t>
             </a:fld>
             <a:endParaRPr lang="en-US"/>
           </a:p>
@@ -3289,7 +3294,7 @@
           <a:p>
             <a:fld id="{18A68141-A2A4-914E-926C-C562912FDC7F}" type="datetimeFigureOut">
               <a:rPr lang="en-US" smtClean="0"/>
-              <a:t>1/16/25</a:t>
+              <a:t>1/19/25</a:t>
             </a:fld>
             <a:endParaRPr lang="en-US"/>
           </a:p>
@@ -3532,7 +3537,7 @@
           <a:p>
             <a:fld id="{18A68141-A2A4-914E-926C-C562912FDC7F}" type="datetimeFigureOut">
               <a:rPr lang="en-US" smtClean="0"/>
-              <a:t>1/16/25</a:t>
+              <a:t>1/19/25</a:t>
             </a:fld>
             <a:endParaRPr lang="en-US"/>
           </a:p>
@@ -4702,7 +4707,7 @@
         </p:nvSpPr>
         <p:spPr>
           <a:xfrm>
-            <a:off x="1810213" y="4881102"/>
+            <a:off x="2614960" y="4872042"/>
             <a:ext cx="1609493" cy="655509"/>
           </a:xfrm>
           <a:prstGeom prst="rect">
@@ -4732,56 +4737,7 @@
             <a:pPr algn="ctr"/>
             <a:r>
               <a:rPr lang="en-US" sz="1300" dirty="0"/>
-              <a:t>Computational time advancement</a:t>
-            </a:r>
-          </a:p>
-        </p:txBody>
-      </p:sp>
-      <p:sp>
-        <p:nvSpPr>
-          <p:cNvPr id="21" name="Rectangle 20">
-            <a:extLst>
-              <a:ext uri="{FF2B5EF4-FFF2-40B4-BE49-F238E27FC236}">
-                <a16:creationId xmlns:a16="http://schemas.microsoft.com/office/drawing/2014/main" id="{DCF8593E-0649-6B4F-B73F-A765C86C48D6}"/>
-              </a:ext>
-            </a:extLst>
-          </p:cNvPr>
-          <p:cNvSpPr/>
-          <p:nvPr/>
-        </p:nvSpPr>
-        <p:spPr>
-          <a:xfrm>
-            <a:off x="3481038" y="4887491"/>
-            <a:ext cx="1609493" cy="655509"/>
-          </a:xfrm>
-          <a:prstGeom prst="rect">
-            <a:avLst/>
-          </a:prstGeom>
-        </p:spPr>
-        <p:style>
-          <a:lnRef idx="2">
-            <a:schemeClr val="accent1">
-              <a:shade val="50000"/>
-            </a:schemeClr>
-          </a:lnRef>
-          <a:fillRef idx="1">
-            <a:schemeClr val="accent1"/>
-          </a:fillRef>
-          <a:effectRef idx="0">
-            <a:schemeClr val="accent1"/>
-          </a:effectRef>
-          <a:fontRef idx="minor">
-            <a:schemeClr val="lt1"/>
-          </a:fontRef>
-        </p:style>
-        <p:txBody>
-          <a:bodyPr rtlCol="0" anchor="ctr"/>
-          <a:lstStyle/>
-          <a:p>
-            <a:pPr algn="ctr"/>
-            <a:r>
-              <a:rPr lang="en-US" sz="1300" dirty="0"/>
-              <a:t>Computational time advancement</a:t>
+              <a:t>Calculate computational time advancement</a:t>
             </a:r>
           </a:p>
         </p:txBody>
@@ -5571,49 +5527,8 @@
         </p:nvCxnSpPr>
         <p:spPr>
           <a:xfrm rot="10800000" flipV="1">
-            <a:off x="2614960" y="4748328"/>
+            <a:off x="3419707" y="4739268"/>
             <a:ext cx="804746" cy="132774"/>
-          </a:xfrm>
-          <a:prstGeom prst="bentConnector2">
-            <a:avLst/>
-          </a:prstGeom>
-          <a:ln>
-            <a:tailEnd type="triangle"/>
-          </a:ln>
-        </p:spPr>
-        <p:style>
-          <a:lnRef idx="1">
-            <a:schemeClr val="accent1"/>
-          </a:lnRef>
-          <a:fillRef idx="0">
-            <a:schemeClr val="accent1"/>
-          </a:fillRef>
-          <a:effectRef idx="0">
-            <a:schemeClr val="accent1"/>
-          </a:effectRef>
-          <a:fontRef idx="minor">
-            <a:schemeClr val="tx1"/>
-          </a:fontRef>
-        </p:style>
-      </p:cxnSp>
-      <p:cxnSp>
-        <p:nvCxnSpPr>
-          <p:cNvPr id="64" name="Elbow Connector 63">
-            <a:extLst>
-              <a:ext uri="{FF2B5EF4-FFF2-40B4-BE49-F238E27FC236}">
-                <a16:creationId xmlns:a16="http://schemas.microsoft.com/office/drawing/2014/main" id="{4CF537FE-81FD-BB41-9623-D887BCDE867A}"/>
-              </a:ext>
-            </a:extLst>
-          </p:cNvPr>
-          <p:cNvCxnSpPr>
-            <a:endCxn id="21" idx="0"/>
-          </p:cNvCxnSpPr>
-          <p:nvPr/>
-        </p:nvCxnSpPr>
-        <p:spPr>
-          <a:xfrm>
-            <a:off x="3419706" y="4764361"/>
-            <a:ext cx="866079" cy="123130"/>
           </a:xfrm>
           <a:prstGeom prst="bentConnector2">
             <a:avLst/>

</xml_diff>

<commit_message>
simplify fig 2, join all ap, remove table
</commit_message>
<xml_diff>
--- a/schematics.pptx
+++ b/schematics.pptx
@@ -199,7 +199,7 @@
           <a:p>
             <a:fld id="{A61E3D00-5EC2-F042-AB36-2E24F3D0F16F}" type="datetimeFigureOut">
               <a:rPr lang="en-US" smtClean="0"/>
-              <a:t>1/19/25</a:t>
+              <a:t>1/20/25</a:t>
             </a:fld>
             <a:endParaRPr lang="en-US"/>
           </a:p>
@@ -868,7 +868,7 @@
           <a:p>
             <a:fld id="{18A68141-A2A4-914E-926C-C562912FDC7F}" type="datetimeFigureOut">
               <a:rPr lang="en-US" smtClean="0"/>
-              <a:t>1/19/25</a:t>
+              <a:t>1/20/25</a:t>
             </a:fld>
             <a:endParaRPr lang="en-US"/>
           </a:p>
@@ -1068,7 +1068,7 @@
           <a:p>
             <a:fld id="{18A68141-A2A4-914E-926C-C562912FDC7F}" type="datetimeFigureOut">
               <a:rPr lang="en-US" smtClean="0"/>
-              <a:t>1/19/25</a:t>
+              <a:t>1/20/25</a:t>
             </a:fld>
             <a:endParaRPr lang="en-US"/>
           </a:p>
@@ -1278,7 +1278,7 @@
           <a:p>
             <a:fld id="{18A68141-A2A4-914E-926C-C562912FDC7F}" type="datetimeFigureOut">
               <a:rPr lang="en-US" smtClean="0"/>
-              <a:t>1/19/25</a:t>
+              <a:t>1/20/25</a:t>
             </a:fld>
             <a:endParaRPr lang="en-US"/>
           </a:p>
@@ -1478,7 +1478,7 @@
           <a:p>
             <a:fld id="{18A68141-A2A4-914E-926C-C562912FDC7F}" type="datetimeFigureOut">
               <a:rPr lang="en-US" smtClean="0"/>
-              <a:t>1/19/25</a:t>
+              <a:t>1/20/25</a:t>
             </a:fld>
             <a:endParaRPr lang="en-US"/>
           </a:p>
@@ -1754,7 +1754,7 @@
           <a:p>
             <a:fld id="{18A68141-A2A4-914E-926C-C562912FDC7F}" type="datetimeFigureOut">
               <a:rPr lang="en-US" smtClean="0"/>
-              <a:t>1/19/25</a:t>
+              <a:t>1/20/25</a:t>
             </a:fld>
             <a:endParaRPr lang="en-US"/>
           </a:p>
@@ -2022,7 +2022,7 @@
           <a:p>
             <a:fld id="{18A68141-A2A4-914E-926C-C562912FDC7F}" type="datetimeFigureOut">
               <a:rPr lang="en-US" smtClean="0"/>
-              <a:t>1/19/25</a:t>
+              <a:t>1/20/25</a:t>
             </a:fld>
             <a:endParaRPr lang="en-US"/>
           </a:p>
@@ -2437,7 +2437,7 @@
           <a:p>
             <a:fld id="{18A68141-A2A4-914E-926C-C562912FDC7F}" type="datetimeFigureOut">
               <a:rPr lang="en-US" smtClean="0"/>
-              <a:t>1/19/25</a:t>
+              <a:t>1/20/25</a:t>
             </a:fld>
             <a:endParaRPr lang="en-US"/>
           </a:p>
@@ -2579,7 +2579,7 @@
           <a:p>
             <a:fld id="{18A68141-A2A4-914E-926C-C562912FDC7F}" type="datetimeFigureOut">
               <a:rPr lang="en-US" smtClean="0"/>
-              <a:t>1/19/25</a:t>
+              <a:t>1/20/25</a:t>
             </a:fld>
             <a:endParaRPr lang="en-US"/>
           </a:p>
@@ -2692,7 +2692,7 @@
           <a:p>
             <a:fld id="{18A68141-A2A4-914E-926C-C562912FDC7F}" type="datetimeFigureOut">
               <a:rPr lang="en-US" smtClean="0"/>
-              <a:t>1/19/25</a:t>
+              <a:t>1/20/25</a:t>
             </a:fld>
             <a:endParaRPr lang="en-US"/>
           </a:p>
@@ -3005,7 +3005,7 @@
           <a:p>
             <a:fld id="{18A68141-A2A4-914E-926C-C562912FDC7F}" type="datetimeFigureOut">
               <a:rPr lang="en-US" smtClean="0"/>
-              <a:t>1/19/25</a:t>
+              <a:t>1/20/25</a:t>
             </a:fld>
             <a:endParaRPr lang="en-US"/>
           </a:p>
@@ -3294,7 +3294,7 @@
           <a:p>
             <a:fld id="{18A68141-A2A4-914E-926C-C562912FDC7F}" type="datetimeFigureOut">
               <a:rPr lang="en-US" smtClean="0"/>
-              <a:t>1/19/25</a:t>
+              <a:t>1/20/25</a:t>
             </a:fld>
             <a:endParaRPr lang="en-US"/>
           </a:p>
@@ -3537,7 +3537,7 @@
           <a:p>
             <a:fld id="{18A68141-A2A4-914E-926C-C562912FDC7F}" type="datetimeFigureOut">
               <a:rPr lang="en-US" smtClean="0"/>
-              <a:t>1/19/25</a:t>
+              <a:t>1/20/25</a:t>
             </a:fld>
             <a:endParaRPr lang="en-US"/>
           </a:p>
@@ -4315,27 +4315,30 @@
         </p:nvSpPr>
         <p:spPr>
           <a:xfrm>
-            <a:off x="579864" y="2800307"/>
+            <a:off x="579864" y="2905409"/>
             <a:ext cx="1709853" cy="713678"/>
           </a:xfrm>
           <a:prstGeom prst="rect">
             <a:avLst/>
           </a:prstGeom>
+          <a:ln w="19050">
+            <a:solidFill>
+              <a:schemeClr val="tx1"/>
+            </a:solidFill>
+          </a:ln>
         </p:spPr>
         <p:style>
           <a:lnRef idx="2">
-            <a:schemeClr val="accent1">
-              <a:shade val="50000"/>
-            </a:schemeClr>
+            <a:schemeClr val="dk1"/>
           </a:lnRef>
           <a:fillRef idx="1">
-            <a:schemeClr val="accent1"/>
+            <a:schemeClr val="lt1"/>
           </a:fillRef>
           <a:effectRef idx="0">
-            <a:schemeClr val="accent1"/>
+            <a:schemeClr val="dk1"/>
           </a:effectRef>
           <a:fontRef idx="minor">
-            <a:schemeClr val="lt1"/>
+            <a:schemeClr val="dk1"/>
           </a:fontRef>
         </p:style>
         <p:txBody>
@@ -4345,7 +4348,7 @@
             <a:pPr algn="ctr"/>
             <a:r>
               <a:rPr lang="en-US" sz="1400" dirty="0"/>
-              <a:t>Run GPU Simulation for 1000 cycles</a:t>
+              <a:t>Run GPU simulation for 1000 cycles</a:t>
             </a:r>
           </a:p>
         </p:txBody>
@@ -4364,27 +4367,30 @@
         </p:nvSpPr>
         <p:spPr>
           <a:xfrm>
-            <a:off x="591015" y="3628288"/>
+            <a:off x="591015" y="3733390"/>
             <a:ext cx="1709853" cy="713678"/>
           </a:xfrm>
           <a:prstGeom prst="rect">
             <a:avLst/>
           </a:prstGeom>
+          <a:ln w="19050">
+            <a:solidFill>
+              <a:schemeClr val="tx1"/>
+            </a:solidFill>
+          </a:ln>
         </p:spPr>
         <p:style>
           <a:lnRef idx="2">
-            <a:schemeClr val="accent1">
-              <a:shade val="50000"/>
-            </a:schemeClr>
+            <a:schemeClr val="dk1"/>
           </a:lnRef>
           <a:fillRef idx="1">
-            <a:schemeClr val="accent1"/>
+            <a:schemeClr val="lt1"/>
           </a:fillRef>
           <a:effectRef idx="0">
-            <a:schemeClr val="accent1"/>
+            <a:schemeClr val="dk1"/>
           </a:effectRef>
           <a:fontRef idx="minor">
-            <a:schemeClr val="lt1"/>
+            <a:schemeClr val="dk1"/>
           </a:fontRef>
         </p:style>
         <p:txBody>
@@ -4394,7 +4400,7 @@
             <a:pPr algn="ctr"/>
             <a:r>
               <a:rPr lang="en-US" sz="1400" dirty="0"/>
-              <a:t>Run CPU Simulation for 1000 cycles</a:t>
+              <a:t>Run CPU simulation for 1000 cycles</a:t>
             </a:r>
           </a:p>
         </p:txBody>
@@ -4413,27 +4419,30 @@
         </p:nvSpPr>
         <p:spPr>
           <a:xfrm>
-            <a:off x="4616604" y="2800307"/>
+            <a:off x="4616604" y="2905409"/>
             <a:ext cx="1709853" cy="713678"/>
           </a:xfrm>
           <a:prstGeom prst="rect">
             <a:avLst/>
           </a:prstGeom>
+          <a:ln w="19050">
+            <a:solidFill>
+              <a:schemeClr val="tx1"/>
+            </a:solidFill>
+          </a:ln>
         </p:spPr>
         <p:style>
           <a:lnRef idx="2">
-            <a:schemeClr val="accent1">
-              <a:shade val="50000"/>
-            </a:schemeClr>
+            <a:schemeClr val="dk1"/>
           </a:lnRef>
           <a:fillRef idx="1">
-            <a:schemeClr val="accent1"/>
+            <a:schemeClr val="lt1"/>
           </a:fillRef>
           <a:effectRef idx="0">
-            <a:schemeClr val="accent1"/>
+            <a:schemeClr val="dk1"/>
           </a:effectRef>
           <a:fontRef idx="minor">
-            <a:schemeClr val="lt1"/>
+            <a:schemeClr val="dk1"/>
           </a:fontRef>
         </p:style>
         <p:txBody>
@@ -4443,7 +4452,7 @@
             <a:pPr algn="ctr"/>
             <a:r>
               <a:rPr lang="en-US" sz="1400" dirty="0"/>
-              <a:t>Run and record GPU Simulation for 1 cycles</a:t>
+              <a:t>Run and record GPU simulation for 1 cycle</a:t>
             </a:r>
           </a:p>
         </p:txBody>
@@ -4462,27 +4471,30 @@
         </p:nvSpPr>
         <p:spPr>
           <a:xfrm>
-            <a:off x="4627755" y="3628288"/>
+            <a:off x="4627755" y="3733390"/>
             <a:ext cx="1709853" cy="713678"/>
           </a:xfrm>
           <a:prstGeom prst="rect">
             <a:avLst/>
           </a:prstGeom>
+          <a:ln w="19050">
+            <a:solidFill>
+              <a:schemeClr val="tx1"/>
+            </a:solidFill>
+          </a:ln>
         </p:spPr>
         <p:style>
           <a:lnRef idx="2">
-            <a:schemeClr val="accent1">
-              <a:shade val="50000"/>
-            </a:schemeClr>
+            <a:schemeClr val="dk1"/>
           </a:lnRef>
           <a:fillRef idx="1">
-            <a:schemeClr val="accent1"/>
+            <a:schemeClr val="lt1"/>
           </a:fillRef>
           <a:effectRef idx="0">
-            <a:schemeClr val="accent1"/>
+            <a:schemeClr val="dk1"/>
           </a:effectRef>
           <a:fontRef idx="minor">
-            <a:schemeClr val="lt1"/>
+            <a:schemeClr val="dk1"/>
           </a:fontRef>
         </p:style>
         <p:txBody>
@@ -4492,14 +4504,14 @@
             <a:pPr algn="ctr"/>
             <a:r>
               <a:rPr lang="en-US" sz="1400" dirty="0"/>
-              <a:t>Run and record CPU Simulation for 1 cycles</a:t>
-            </a:r>
-          </a:p>
-        </p:txBody>
-      </p:sp>
-      <p:sp>
-        <p:nvSpPr>
-          <p:cNvPr id="16" name="Rectangle 15">
+              <a:t>Run and record CPU simulation for 1 cycle</a:t>
+            </a:r>
+          </a:p>
+        </p:txBody>
+      </p:sp>
+      <p:sp>
+        <p:nvSpPr>
+          <p:cNvPr id="16" name="Data 15">
             <a:extLst>
               <a:ext uri="{FF2B5EF4-FFF2-40B4-BE49-F238E27FC236}">
                 <a16:creationId xmlns:a16="http://schemas.microsoft.com/office/drawing/2014/main" id="{05C3069A-8697-214B-9FB1-B66DB78A1E56}"/>
@@ -4511,27 +4523,30 @@
         </p:nvSpPr>
         <p:spPr>
           <a:xfrm>
-            <a:off x="2603809" y="2800307"/>
+            <a:off x="2603809" y="2905409"/>
             <a:ext cx="1709853" cy="713678"/>
           </a:xfrm>
-          <a:prstGeom prst="rect">
-            <a:avLst/>
-          </a:prstGeom>
+          <a:prstGeom prst="flowChartInputOutput">
+            <a:avLst/>
+          </a:prstGeom>
+          <a:ln w="19050">
+            <a:solidFill>
+              <a:schemeClr val="tx1"/>
+            </a:solidFill>
+          </a:ln>
         </p:spPr>
         <p:style>
           <a:lnRef idx="2">
-            <a:schemeClr val="accent1">
-              <a:shade val="50000"/>
-            </a:schemeClr>
+            <a:schemeClr val="dk1"/>
           </a:lnRef>
           <a:fillRef idx="1">
-            <a:schemeClr val="accent1"/>
+            <a:schemeClr val="lt1"/>
           </a:fillRef>
           <a:effectRef idx="0">
-            <a:schemeClr val="accent1"/>
+            <a:schemeClr val="dk1"/>
           </a:effectRef>
           <a:fontRef idx="minor">
-            <a:schemeClr val="lt1"/>
+            <a:schemeClr val="dk1"/>
           </a:fontRef>
         </p:style>
         <p:txBody>
@@ -4540,7 +4555,7 @@
           <a:p>
             <a:pPr algn="ctr"/>
             <a:r>
-              <a:rPr lang="en-US" sz="1400" dirty="0"/>
+              <a:rPr lang="en-US" sz="1100" dirty="0"/>
               <a:t>Save initial states for GPU simulation</a:t>
             </a:r>
           </a:p>
@@ -4548,7 +4563,7 @@
       </p:sp>
       <p:sp>
         <p:nvSpPr>
-          <p:cNvPr id="17" name="Rectangle 16">
+          <p:cNvPr id="17" name="Data 16">
             <a:extLst>
               <a:ext uri="{FF2B5EF4-FFF2-40B4-BE49-F238E27FC236}">
                 <a16:creationId xmlns:a16="http://schemas.microsoft.com/office/drawing/2014/main" id="{ECE2DC23-54BA-5A48-BF61-4F533623A5CD}"/>
@@ -4560,27 +4575,30 @@
         </p:nvSpPr>
         <p:spPr>
           <a:xfrm>
-            <a:off x="2614960" y="3639439"/>
+            <a:off x="2614960" y="3744541"/>
             <a:ext cx="1709853" cy="713678"/>
           </a:xfrm>
-          <a:prstGeom prst="rect">
-            <a:avLst/>
-          </a:prstGeom>
+          <a:prstGeom prst="flowChartInputOutput">
+            <a:avLst/>
+          </a:prstGeom>
+          <a:ln w="19050">
+            <a:solidFill>
+              <a:schemeClr val="tx1"/>
+            </a:solidFill>
+          </a:ln>
         </p:spPr>
         <p:style>
           <a:lnRef idx="2">
-            <a:schemeClr val="accent1">
-              <a:shade val="50000"/>
-            </a:schemeClr>
+            <a:schemeClr val="dk1"/>
           </a:lnRef>
           <a:fillRef idx="1">
-            <a:schemeClr val="accent1"/>
+            <a:schemeClr val="lt1"/>
           </a:fillRef>
           <a:effectRef idx="0">
-            <a:schemeClr val="accent1"/>
+            <a:schemeClr val="dk1"/>
           </a:effectRef>
           <a:fontRef idx="minor">
-            <a:schemeClr val="lt1"/>
+            <a:schemeClr val="dk1"/>
           </a:fontRef>
         </p:style>
         <p:txBody>
@@ -4589,7 +4607,7 @@
           <a:p>
             <a:pPr algn="ctr"/>
             <a:r>
-              <a:rPr lang="en-US" sz="1400" dirty="0"/>
+              <a:rPr lang="en-US" sz="1100" dirty="0"/>
               <a:t>Save initial states for CPU simulation</a:t>
             </a:r>
           </a:p>
@@ -4597,10 +4615,10 @@
       </p:sp>
       <p:sp>
         <p:nvSpPr>
-          <p:cNvPr id="18" name="Rectangle 17">
-            <a:extLst>
-              <a:ext uri="{FF2B5EF4-FFF2-40B4-BE49-F238E27FC236}">
-                <a16:creationId xmlns:a16="http://schemas.microsoft.com/office/drawing/2014/main" id="{D4748138-8DBE-D945-9228-CF72312AC51B}"/>
+          <p:cNvPr id="19" name="Rectangle 18">
+            <a:extLst>
+              <a:ext uri="{FF2B5EF4-FFF2-40B4-BE49-F238E27FC236}">
+                <a16:creationId xmlns:a16="http://schemas.microsoft.com/office/drawing/2014/main" id="{8DA222C6-A2F4-6A46-ACE3-D6F5AF8D496C}"/>
               </a:ext>
             </a:extLst>
           </p:cNvPr>
@@ -4609,27 +4627,30 @@
         </p:nvSpPr>
         <p:spPr>
           <a:xfrm>
-            <a:off x="7921082" y="3108358"/>
-            <a:ext cx="1962615" cy="953429"/>
+            <a:off x="6515097" y="3414182"/>
+            <a:ext cx="1168091" cy="524109"/>
           </a:xfrm>
           <a:prstGeom prst="rect">
             <a:avLst/>
           </a:prstGeom>
+          <a:ln w="19050">
+            <a:solidFill>
+              <a:schemeClr val="tx1"/>
+            </a:solidFill>
+          </a:ln>
         </p:spPr>
         <p:style>
           <a:lnRef idx="2">
-            <a:schemeClr val="accent1">
-              <a:shade val="50000"/>
-            </a:schemeClr>
+            <a:schemeClr val="dk1"/>
           </a:lnRef>
           <a:fillRef idx="1">
-            <a:schemeClr val="accent1"/>
+            <a:schemeClr val="lt1"/>
           </a:fillRef>
           <a:effectRef idx="0">
-            <a:schemeClr val="accent1"/>
+            <a:schemeClr val="dk1"/>
           </a:effectRef>
           <a:fontRef idx="minor">
-            <a:schemeClr val="lt1"/>
+            <a:schemeClr val="dk1"/>
           </a:fontRef>
         </p:style>
         <p:txBody>
@@ -4638,18 +4659,18 @@
           <a:p>
             <a:pPr algn="ctr"/>
             <a:r>
-              <a:rPr lang="en-US" sz="1400" dirty="0"/>
-              <a:t>Validate GPU action potential to CPU result</a:t>
-            </a:r>
-          </a:p>
-        </p:txBody>
-      </p:sp>
-      <p:sp>
-        <p:nvSpPr>
-          <p:cNvPr id="19" name="Rectangle 18">
-            <a:extLst>
-              <a:ext uri="{FF2B5EF4-FFF2-40B4-BE49-F238E27FC236}">
-                <a16:creationId xmlns:a16="http://schemas.microsoft.com/office/drawing/2014/main" id="{8DA222C6-A2F4-6A46-ACE3-D6F5AF8D496C}"/>
+              <a:rPr lang="en-US" sz="1200" dirty="0"/>
+              <a:t>Record computing time</a:t>
+            </a:r>
+          </a:p>
+        </p:txBody>
+      </p:sp>
+      <p:sp>
+        <p:nvSpPr>
+          <p:cNvPr id="20" name="Rectangle 19">
+            <a:extLst>
+              <a:ext uri="{FF2B5EF4-FFF2-40B4-BE49-F238E27FC236}">
+                <a16:creationId xmlns:a16="http://schemas.microsoft.com/office/drawing/2014/main" id="{11173028-0953-B847-818E-A59AC6871FCA}"/>
               </a:ext>
             </a:extLst>
           </p:cNvPr>
@@ -4658,27 +4679,30 @@
         </p:nvSpPr>
         <p:spPr>
           <a:xfrm>
-            <a:off x="6515097" y="3309080"/>
-            <a:ext cx="1168091" cy="524109"/>
+            <a:off x="2063673" y="4974753"/>
+            <a:ext cx="1609493" cy="655509"/>
           </a:xfrm>
           <a:prstGeom prst="rect">
             <a:avLst/>
           </a:prstGeom>
+          <a:ln w="19050">
+            <a:solidFill>
+              <a:schemeClr val="tx1"/>
+            </a:solidFill>
+          </a:ln>
         </p:spPr>
         <p:style>
           <a:lnRef idx="2">
-            <a:schemeClr val="accent1">
-              <a:shade val="50000"/>
-            </a:schemeClr>
+            <a:schemeClr val="dk1"/>
           </a:lnRef>
           <a:fillRef idx="1">
-            <a:schemeClr val="accent1"/>
+            <a:schemeClr val="lt1"/>
           </a:fillRef>
           <a:effectRef idx="0">
-            <a:schemeClr val="accent1"/>
+            <a:schemeClr val="dk1"/>
           </a:effectRef>
           <a:fontRef idx="minor">
-            <a:schemeClr val="lt1"/>
+            <a:schemeClr val="dk1"/>
           </a:fontRef>
         </p:style>
         <p:txBody>
@@ -4687,18 +4711,18 @@
           <a:p>
             <a:pPr algn="ctr"/>
             <a:r>
-              <a:rPr lang="en-US" sz="1200" dirty="0"/>
-              <a:t>Record computing time</a:t>
-            </a:r>
-          </a:p>
-        </p:txBody>
-      </p:sp>
-      <p:sp>
-        <p:nvSpPr>
-          <p:cNvPr id="20" name="Rectangle 19">
-            <a:extLst>
-              <a:ext uri="{FF2B5EF4-FFF2-40B4-BE49-F238E27FC236}">
-                <a16:creationId xmlns:a16="http://schemas.microsoft.com/office/drawing/2014/main" id="{11173028-0953-B847-818E-A59AC6871FCA}"/>
+              <a:rPr lang="en-US" sz="1300" dirty="0"/>
+              <a:t>Compare CPU and GPU computing time</a:t>
+            </a:r>
+          </a:p>
+        </p:txBody>
+      </p:sp>
+      <p:sp>
+        <p:nvSpPr>
+          <p:cNvPr id="22" name="Rectangle 21">
+            <a:extLst>
+              <a:ext uri="{FF2B5EF4-FFF2-40B4-BE49-F238E27FC236}">
+                <a16:creationId xmlns:a16="http://schemas.microsoft.com/office/drawing/2014/main" id="{98289387-362E-A14B-B08D-741488875253}"/>
               </a:ext>
             </a:extLst>
           </p:cNvPr>
@@ -4707,27 +4731,30 @@
         </p:nvSpPr>
         <p:spPr>
           <a:xfrm>
-            <a:off x="2614960" y="4872042"/>
+            <a:off x="10187600" y="2763793"/>
             <a:ext cx="1609493" cy="655509"/>
           </a:xfrm>
           <a:prstGeom prst="rect">
             <a:avLst/>
           </a:prstGeom>
+          <a:ln w="19050">
+            <a:solidFill>
+              <a:schemeClr val="tx1"/>
+            </a:solidFill>
+          </a:ln>
         </p:spPr>
         <p:style>
           <a:lnRef idx="2">
-            <a:schemeClr val="accent1">
-              <a:shade val="50000"/>
-            </a:schemeClr>
+            <a:schemeClr val="dk1"/>
           </a:lnRef>
           <a:fillRef idx="1">
-            <a:schemeClr val="accent1"/>
+            <a:schemeClr val="lt1"/>
           </a:fillRef>
           <a:effectRef idx="0">
-            <a:schemeClr val="accent1"/>
+            <a:schemeClr val="dk1"/>
           </a:effectRef>
           <a:fontRef idx="minor">
-            <a:schemeClr val="lt1"/>
+            <a:schemeClr val="dk1"/>
           </a:fontRef>
         </p:style>
         <p:txBody>
@@ -4737,17 +4764,17 @@
             <a:pPr algn="ctr"/>
             <a:r>
               <a:rPr lang="en-US" sz="1300" dirty="0"/>
-              <a:t>Calculate computational time advancement</a:t>
-            </a:r>
-          </a:p>
-        </p:txBody>
-      </p:sp>
-      <p:sp>
-        <p:nvSpPr>
-          <p:cNvPr id="22" name="Rectangle 21">
-            <a:extLst>
-              <a:ext uri="{FF2B5EF4-FFF2-40B4-BE49-F238E27FC236}">
-                <a16:creationId xmlns:a16="http://schemas.microsoft.com/office/drawing/2014/main" id="{98289387-362E-A14B-B08D-741488875253}"/>
+              <a:t>Compare action potential shape of GPU and CPU result</a:t>
+            </a:r>
+          </a:p>
+        </p:txBody>
+      </p:sp>
+      <p:sp>
+        <p:nvSpPr>
+          <p:cNvPr id="23" name="Rectangle 22">
+            <a:extLst>
+              <a:ext uri="{FF2B5EF4-FFF2-40B4-BE49-F238E27FC236}">
+                <a16:creationId xmlns:a16="http://schemas.microsoft.com/office/drawing/2014/main" id="{720817DA-D5AC-AB44-9972-07A618DB5597}"/>
               </a:ext>
             </a:extLst>
           </p:cNvPr>
@@ -4756,27 +4783,30 @@
         </p:nvSpPr>
         <p:spPr>
           <a:xfrm>
-            <a:off x="6597803" y="4880849"/>
+            <a:off x="6847998" y="4929694"/>
             <a:ext cx="1609493" cy="655509"/>
           </a:xfrm>
           <a:prstGeom prst="rect">
             <a:avLst/>
           </a:prstGeom>
+          <a:ln w="19050">
+            <a:solidFill>
+              <a:schemeClr val="tx1"/>
+            </a:solidFill>
+          </a:ln>
         </p:spPr>
         <p:style>
           <a:lnRef idx="2">
-            <a:schemeClr val="accent1">
-              <a:shade val="50000"/>
-            </a:schemeClr>
+            <a:schemeClr val="dk1"/>
           </a:lnRef>
           <a:fillRef idx="1">
-            <a:schemeClr val="accent1"/>
+            <a:schemeClr val="lt1"/>
           </a:fillRef>
           <a:effectRef idx="0">
-            <a:schemeClr val="accent1"/>
+            <a:schemeClr val="dk1"/>
           </a:effectRef>
           <a:fontRef idx="minor">
-            <a:schemeClr val="lt1"/>
+            <a:schemeClr val="dk1"/>
           </a:fontRef>
         </p:style>
         <p:txBody>
@@ -4786,56 +4816,7 @@
             <a:pPr algn="ctr"/>
             <a:r>
               <a:rPr lang="en-US" sz="1300" dirty="0"/>
-              <a:t>Compare action potential shape and MAE</a:t>
-            </a:r>
-          </a:p>
-        </p:txBody>
-      </p:sp>
-      <p:sp>
-        <p:nvSpPr>
-          <p:cNvPr id="23" name="Rectangle 22">
-            <a:extLst>
-              <a:ext uri="{FF2B5EF4-FFF2-40B4-BE49-F238E27FC236}">
-                <a16:creationId xmlns:a16="http://schemas.microsoft.com/office/drawing/2014/main" id="{720817DA-D5AC-AB44-9972-07A618DB5597}"/>
-              </a:ext>
-            </a:extLst>
-          </p:cNvPr>
-          <p:cNvSpPr/>
-          <p:nvPr/>
-        </p:nvSpPr>
-        <p:spPr>
-          <a:xfrm>
-            <a:off x="8268628" y="4880848"/>
-            <a:ext cx="1609493" cy="655509"/>
-          </a:xfrm>
-          <a:prstGeom prst="rect">
-            <a:avLst/>
-          </a:prstGeom>
-        </p:spPr>
-        <p:style>
-          <a:lnRef idx="2">
-            <a:schemeClr val="accent1">
-              <a:shade val="50000"/>
-            </a:schemeClr>
-          </a:lnRef>
-          <a:fillRef idx="1">
-            <a:schemeClr val="accent1"/>
-          </a:fillRef>
-          <a:effectRef idx="0">
-            <a:schemeClr val="accent1"/>
-          </a:effectRef>
-          <a:fontRef idx="minor">
-            <a:schemeClr val="lt1"/>
-          </a:fontRef>
-        </p:style>
-        <p:txBody>
-          <a:bodyPr rtlCol="0" anchor="ctr"/>
-          <a:lstStyle/>
-          <a:p>
-            <a:pPr algn="ctr"/>
-            <a:r>
-              <a:rPr lang="en-US" sz="1300" dirty="0"/>
-              <a:t>Compare action potential for under drug and drug free</a:t>
+              <a:t>Check how drug affect the simulation </a:t>
             </a:r>
           </a:p>
         </p:txBody>
@@ -5197,6 +5178,1006 @@
           <a:prstGeom prst="rect">
             <a:avLst/>
           </a:prstGeom>
+          <a:ln w="19050">
+            <a:solidFill>
+              <a:schemeClr val="tx1"/>
+            </a:solidFill>
+          </a:ln>
+        </p:spPr>
+        <p:style>
+          <a:lnRef idx="2">
+            <a:schemeClr val="dk1"/>
+          </a:lnRef>
+          <a:fillRef idx="1">
+            <a:schemeClr val="lt1"/>
+          </a:fillRef>
+          <a:effectRef idx="0">
+            <a:schemeClr val="dk1"/>
+          </a:effectRef>
+          <a:fontRef idx="minor">
+            <a:schemeClr val="dk1"/>
+          </a:fontRef>
+        </p:style>
+        <p:txBody>
+          <a:bodyPr rtlCol="0" anchor="ctr"/>
+          <a:lstStyle/>
+          <a:p>
+            <a:pPr algn="ctr"/>
+            <a:r>
+              <a:rPr lang="en-US" sz="1200" dirty="0"/>
+              <a:t>Simulation scenarios:</a:t>
+            </a:r>
+          </a:p>
+        </p:txBody>
+      </p:sp>
+      <p:sp>
+        <p:nvSpPr>
+          <p:cNvPr id="46" name="Rectangle 45">
+            <a:extLst>
+              <a:ext uri="{FF2B5EF4-FFF2-40B4-BE49-F238E27FC236}">
+                <a16:creationId xmlns:a16="http://schemas.microsoft.com/office/drawing/2014/main" id="{762E5292-7126-B745-8D56-FA0CF9E78176}"/>
+              </a:ext>
+            </a:extLst>
+          </p:cNvPr>
+          <p:cNvSpPr/>
+          <p:nvPr/>
+        </p:nvSpPr>
+        <p:spPr>
+          <a:xfrm>
+            <a:off x="5226205" y="2315508"/>
+            <a:ext cx="4651917" cy="364924"/>
+          </a:xfrm>
+          <a:prstGeom prst="rect">
+            <a:avLst/>
+          </a:prstGeom>
+          <a:ln w="19050">
+            <a:solidFill>
+              <a:schemeClr val="tx1"/>
+            </a:solidFill>
+          </a:ln>
+        </p:spPr>
+        <p:style>
+          <a:lnRef idx="2">
+            <a:schemeClr val="dk1"/>
+          </a:lnRef>
+          <a:fillRef idx="1">
+            <a:schemeClr val="lt1"/>
+          </a:fillRef>
+          <a:effectRef idx="0">
+            <a:schemeClr val="dk1"/>
+          </a:effectRef>
+          <a:fontRef idx="minor">
+            <a:schemeClr val="dk1"/>
+          </a:fontRef>
+        </p:style>
+        <p:txBody>
+          <a:bodyPr rtlCol="0" anchor="ctr"/>
+          <a:lstStyle/>
+          <a:p>
+            <a:pPr algn="ctr"/>
+            <a:r>
+              <a:rPr lang="en-US" sz="1200" dirty="0"/>
+              <a:t>Drug free (concentration: 0 mMol)</a:t>
+            </a:r>
+          </a:p>
+        </p:txBody>
+      </p:sp>
+      <p:sp>
+        <p:nvSpPr>
+          <p:cNvPr id="47" name="Rectangle 46">
+            <a:extLst>
+              <a:ext uri="{FF2B5EF4-FFF2-40B4-BE49-F238E27FC236}">
+                <a16:creationId xmlns:a16="http://schemas.microsoft.com/office/drawing/2014/main" id="{1296B7A6-D52A-0245-9222-842DFAD6DF8D}"/>
+              </a:ext>
+            </a:extLst>
+          </p:cNvPr>
+          <p:cNvSpPr/>
+          <p:nvPr/>
+        </p:nvSpPr>
+        <p:spPr>
+          <a:xfrm>
+            <a:off x="544550" y="2315507"/>
+            <a:ext cx="4663069" cy="364923"/>
+          </a:xfrm>
+          <a:prstGeom prst="rect">
+            <a:avLst/>
+          </a:prstGeom>
+          <a:ln w="19050">
+            <a:solidFill>
+              <a:schemeClr val="tx1"/>
+            </a:solidFill>
+          </a:ln>
+        </p:spPr>
+        <p:style>
+          <a:lnRef idx="2">
+            <a:schemeClr val="dk1"/>
+          </a:lnRef>
+          <a:fillRef idx="1">
+            <a:schemeClr val="lt1"/>
+          </a:fillRef>
+          <a:effectRef idx="0">
+            <a:schemeClr val="dk1"/>
+          </a:effectRef>
+          <a:fontRef idx="minor">
+            <a:schemeClr val="dk1"/>
+          </a:fontRef>
+        </p:style>
+        <p:txBody>
+          <a:bodyPr rtlCol="0" anchor="ctr"/>
+          <a:lstStyle/>
+          <a:p>
+            <a:pPr algn="ctr"/>
+            <a:r>
+              <a:rPr lang="en-US" sz="1100" dirty="0"/>
+              <a:t>Under drug : bepridil ( concentration: 33, 66, 132 mMol)</a:t>
+            </a:r>
+          </a:p>
+        </p:txBody>
+      </p:sp>
+      <p:cxnSp>
+        <p:nvCxnSpPr>
+          <p:cNvPr id="60" name="Elbow Connector 59">
+            <a:extLst>
+              <a:ext uri="{FF2B5EF4-FFF2-40B4-BE49-F238E27FC236}">
+                <a16:creationId xmlns:a16="http://schemas.microsoft.com/office/drawing/2014/main" id="{034FC4A2-54C3-EA4A-A713-1E9C3C3F8CB2}"/>
+              </a:ext>
+            </a:extLst>
+          </p:cNvPr>
+          <p:cNvCxnSpPr>
+            <a:stCxn id="19" idx="2"/>
+          </p:cNvCxnSpPr>
+          <p:nvPr/>
+        </p:nvCxnSpPr>
+        <p:spPr>
+          <a:xfrm rot="5400000">
+            <a:off x="4806386" y="2551612"/>
+            <a:ext cx="906079" cy="3679437"/>
+          </a:xfrm>
+          <a:prstGeom prst="bentConnector2">
+            <a:avLst/>
+          </a:prstGeom>
+          <a:ln w="19050">
+            <a:solidFill>
+              <a:schemeClr val="tx1"/>
+            </a:solidFill>
+          </a:ln>
+        </p:spPr>
+        <p:style>
+          <a:lnRef idx="2">
+            <a:schemeClr val="dk1"/>
+          </a:lnRef>
+          <a:fillRef idx="1">
+            <a:schemeClr val="lt1"/>
+          </a:fillRef>
+          <a:effectRef idx="0">
+            <a:schemeClr val="dk1"/>
+          </a:effectRef>
+          <a:fontRef idx="minor">
+            <a:schemeClr val="dk1"/>
+          </a:fontRef>
+        </p:style>
+      </p:cxnSp>
+      <p:cxnSp>
+        <p:nvCxnSpPr>
+          <p:cNvPr id="62" name="Elbow Connector 61">
+            <a:extLst>
+              <a:ext uri="{FF2B5EF4-FFF2-40B4-BE49-F238E27FC236}">
+                <a16:creationId xmlns:a16="http://schemas.microsoft.com/office/drawing/2014/main" id="{4A82A34B-C86F-FA40-BDD3-B490BBCF888E}"/>
+              </a:ext>
+            </a:extLst>
+          </p:cNvPr>
+          <p:cNvCxnSpPr>
+            <a:endCxn id="20" idx="0"/>
+          </p:cNvCxnSpPr>
+          <p:nvPr/>
+        </p:nvCxnSpPr>
+        <p:spPr>
+          <a:xfrm rot="10800000" flipV="1">
+            <a:off x="2868420" y="4841979"/>
+            <a:ext cx="804746" cy="132774"/>
+          </a:xfrm>
+          <a:prstGeom prst="bentConnector2">
+            <a:avLst/>
+          </a:prstGeom>
+          <a:ln w="19050">
+            <a:solidFill>
+              <a:schemeClr val="tx1"/>
+            </a:solidFill>
+            <a:tailEnd type="triangle"/>
+          </a:ln>
+        </p:spPr>
+        <p:style>
+          <a:lnRef idx="2">
+            <a:schemeClr val="dk1"/>
+          </a:lnRef>
+          <a:fillRef idx="1">
+            <a:schemeClr val="lt1"/>
+          </a:fillRef>
+          <a:effectRef idx="0">
+            <a:schemeClr val="dk1"/>
+          </a:effectRef>
+          <a:fontRef idx="minor">
+            <a:schemeClr val="dk1"/>
+          </a:fontRef>
+        </p:style>
+      </p:cxnSp>
+      <p:cxnSp>
+        <p:nvCxnSpPr>
+          <p:cNvPr id="71" name="Elbow Connector 70">
+            <a:extLst>
+              <a:ext uri="{FF2B5EF4-FFF2-40B4-BE49-F238E27FC236}">
+                <a16:creationId xmlns:a16="http://schemas.microsoft.com/office/drawing/2014/main" id="{4020AF62-16A6-484B-B867-463421CDCD98}"/>
+              </a:ext>
+            </a:extLst>
+          </p:cNvPr>
+          <p:cNvCxnSpPr>
+            <a:cxnSpLocks/>
+            <a:stCxn id="31" idx="5"/>
+            <a:endCxn id="22" idx="1"/>
+          </p:cNvCxnSpPr>
+          <p:nvPr/>
+        </p:nvCxnSpPr>
+        <p:spPr>
+          <a:xfrm flipV="1">
+            <a:off x="9103496" y="3091548"/>
+            <a:ext cx="1084104" cy="587519"/>
+          </a:xfrm>
+          <a:prstGeom prst="bentConnector3">
+            <a:avLst>
+              <a:gd name="adj1" fmla="val 50000"/>
+            </a:avLst>
+          </a:prstGeom>
+          <a:ln w="19050">
+            <a:solidFill>
+              <a:schemeClr val="tx1"/>
+            </a:solidFill>
+            <a:tailEnd type="triangle"/>
+          </a:ln>
+        </p:spPr>
+        <p:style>
+          <a:lnRef idx="2">
+            <a:schemeClr val="dk1"/>
+          </a:lnRef>
+          <a:fillRef idx="1">
+            <a:schemeClr val="lt1"/>
+          </a:fillRef>
+          <a:effectRef idx="0">
+            <a:schemeClr val="dk1"/>
+          </a:effectRef>
+          <a:fontRef idx="minor">
+            <a:schemeClr val="dk1"/>
+          </a:fontRef>
+        </p:style>
+      </p:cxnSp>
+      <p:cxnSp>
+        <p:nvCxnSpPr>
+          <p:cNvPr id="75" name="Straight Arrow Connector 74">
+            <a:extLst>
+              <a:ext uri="{FF2B5EF4-FFF2-40B4-BE49-F238E27FC236}">
+                <a16:creationId xmlns:a16="http://schemas.microsoft.com/office/drawing/2014/main" id="{35BF0DF6-21DF-A541-B70E-256A04DA182B}"/>
+              </a:ext>
+            </a:extLst>
+          </p:cNvPr>
+          <p:cNvCxnSpPr>
+            <a:stCxn id="12" idx="3"/>
+          </p:cNvCxnSpPr>
+          <p:nvPr/>
+        </p:nvCxnSpPr>
+        <p:spPr>
+          <a:xfrm>
+            <a:off x="2289717" y="3262248"/>
+            <a:ext cx="314092" cy="0"/>
+          </a:xfrm>
+          <a:prstGeom prst="straightConnector1">
+            <a:avLst/>
+          </a:prstGeom>
+          <a:ln w="19050">
+            <a:solidFill>
+              <a:schemeClr val="tx1"/>
+            </a:solidFill>
+            <a:tailEnd type="triangle"/>
+          </a:ln>
+        </p:spPr>
+        <p:style>
+          <a:lnRef idx="2">
+            <a:schemeClr val="dk1"/>
+          </a:lnRef>
+          <a:fillRef idx="1">
+            <a:schemeClr val="lt1"/>
+          </a:fillRef>
+          <a:effectRef idx="0">
+            <a:schemeClr val="dk1"/>
+          </a:effectRef>
+          <a:fontRef idx="minor">
+            <a:schemeClr val="dk1"/>
+          </a:fontRef>
+        </p:style>
+      </p:cxnSp>
+      <p:cxnSp>
+        <p:nvCxnSpPr>
+          <p:cNvPr id="77" name="Straight Arrow Connector 76">
+            <a:extLst>
+              <a:ext uri="{FF2B5EF4-FFF2-40B4-BE49-F238E27FC236}">
+                <a16:creationId xmlns:a16="http://schemas.microsoft.com/office/drawing/2014/main" id="{BD75DCF0-96A7-F24E-B515-6E01D3C22184}"/>
+              </a:ext>
+            </a:extLst>
+          </p:cNvPr>
+          <p:cNvCxnSpPr>
+            <a:stCxn id="13" idx="3"/>
+          </p:cNvCxnSpPr>
+          <p:nvPr/>
+        </p:nvCxnSpPr>
+        <p:spPr>
+          <a:xfrm>
+            <a:off x="2300868" y="4090229"/>
+            <a:ext cx="314092" cy="11151"/>
+          </a:xfrm>
+          <a:prstGeom prst="straightConnector1">
+            <a:avLst/>
+          </a:prstGeom>
+          <a:ln w="19050">
+            <a:solidFill>
+              <a:schemeClr val="tx1"/>
+            </a:solidFill>
+            <a:tailEnd type="triangle"/>
+          </a:ln>
+        </p:spPr>
+        <p:style>
+          <a:lnRef idx="2">
+            <a:schemeClr val="dk1"/>
+          </a:lnRef>
+          <a:fillRef idx="1">
+            <a:schemeClr val="lt1"/>
+          </a:fillRef>
+          <a:effectRef idx="0">
+            <a:schemeClr val="dk1"/>
+          </a:effectRef>
+          <a:fontRef idx="minor">
+            <a:schemeClr val="dk1"/>
+          </a:fontRef>
+        </p:style>
+      </p:cxnSp>
+      <p:cxnSp>
+        <p:nvCxnSpPr>
+          <p:cNvPr id="79" name="Straight Arrow Connector 78">
+            <a:extLst>
+              <a:ext uri="{FF2B5EF4-FFF2-40B4-BE49-F238E27FC236}">
+                <a16:creationId xmlns:a16="http://schemas.microsoft.com/office/drawing/2014/main" id="{12D3ECA4-DC8B-1E4E-ADD6-101EF4882937}"/>
+              </a:ext>
+            </a:extLst>
+          </p:cNvPr>
+          <p:cNvCxnSpPr>
+            <a:endCxn id="14" idx="1"/>
+          </p:cNvCxnSpPr>
+          <p:nvPr/>
+        </p:nvCxnSpPr>
+        <p:spPr>
+          <a:xfrm>
+            <a:off x="4313662" y="3262248"/>
+            <a:ext cx="302942" cy="0"/>
+          </a:xfrm>
+          <a:prstGeom prst="straightConnector1">
+            <a:avLst/>
+          </a:prstGeom>
+          <a:ln w="19050">
+            <a:solidFill>
+              <a:schemeClr val="tx1"/>
+            </a:solidFill>
+            <a:tailEnd type="triangle"/>
+          </a:ln>
+        </p:spPr>
+        <p:style>
+          <a:lnRef idx="2">
+            <a:schemeClr val="dk1"/>
+          </a:lnRef>
+          <a:fillRef idx="1">
+            <a:schemeClr val="lt1"/>
+          </a:fillRef>
+          <a:effectRef idx="0">
+            <a:schemeClr val="dk1"/>
+          </a:effectRef>
+          <a:fontRef idx="minor">
+            <a:schemeClr val="dk1"/>
+          </a:fontRef>
+        </p:style>
+      </p:cxnSp>
+      <p:cxnSp>
+        <p:nvCxnSpPr>
+          <p:cNvPr id="81" name="Straight Arrow Connector 80">
+            <a:extLst>
+              <a:ext uri="{FF2B5EF4-FFF2-40B4-BE49-F238E27FC236}">
+                <a16:creationId xmlns:a16="http://schemas.microsoft.com/office/drawing/2014/main" id="{CAE469AC-7C32-6C49-AB5E-7AFA0721830F}"/>
+              </a:ext>
+            </a:extLst>
+          </p:cNvPr>
+          <p:cNvCxnSpPr>
+            <a:endCxn id="15" idx="1"/>
+          </p:cNvCxnSpPr>
+          <p:nvPr/>
+        </p:nvCxnSpPr>
+        <p:spPr>
+          <a:xfrm flipV="1">
+            <a:off x="4324813" y="4090229"/>
+            <a:ext cx="302942" cy="11151"/>
+          </a:xfrm>
+          <a:prstGeom prst="straightConnector1">
+            <a:avLst/>
+          </a:prstGeom>
+          <a:ln w="19050">
+            <a:solidFill>
+              <a:schemeClr val="tx1"/>
+            </a:solidFill>
+            <a:tailEnd type="triangle"/>
+          </a:ln>
+        </p:spPr>
+        <p:style>
+          <a:lnRef idx="2">
+            <a:schemeClr val="dk1"/>
+          </a:lnRef>
+          <a:fillRef idx="1">
+            <a:schemeClr val="lt1"/>
+          </a:fillRef>
+          <a:effectRef idx="0">
+            <a:schemeClr val="dk1"/>
+          </a:effectRef>
+          <a:fontRef idx="minor">
+            <a:schemeClr val="dk1"/>
+          </a:fontRef>
+        </p:style>
+      </p:cxnSp>
+      <p:cxnSp>
+        <p:nvCxnSpPr>
+          <p:cNvPr id="83" name="Straight Arrow Connector 82">
+            <a:extLst>
+              <a:ext uri="{FF2B5EF4-FFF2-40B4-BE49-F238E27FC236}">
+                <a16:creationId xmlns:a16="http://schemas.microsoft.com/office/drawing/2014/main" id="{5E2D6F59-ECC3-CD4F-BA3F-FD3ADCD5FFFC}"/>
+              </a:ext>
+            </a:extLst>
+          </p:cNvPr>
+          <p:cNvCxnSpPr>
+            <a:stCxn id="14" idx="3"/>
+            <a:endCxn id="19" idx="1"/>
+          </p:cNvCxnSpPr>
+          <p:nvPr/>
+        </p:nvCxnSpPr>
+        <p:spPr>
+          <a:xfrm>
+            <a:off x="6326457" y="3262248"/>
+            <a:ext cx="188640" cy="413989"/>
+          </a:xfrm>
+          <a:prstGeom prst="straightConnector1">
+            <a:avLst/>
+          </a:prstGeom>
+          <a:ln w="19050">
+            <a:solidFill>
+              <a:schemeClr val="tx1"/>
+            </a:solidFill>
+            <a:tailEnd type="triangle"/>
+          </a:ln>
+        </p:spPr>
+        <p:style>
+          <a:lnRef idx="2">
+            <a:schemeClr val="dk1"/>
+          </a:lnRef>
+          <a:fillRef idx="1">
+            <a:schemeClr val="lt1"/>
+          </a:fillRef>
+          <a:effectRef idx="0">
+            <a:schemeClr val="dk1"/>
+          </a:effectRef>
+          <a:fontRef idx="minor">
+            <a:schemeClr val="dk1"/>
+          </a:fontRef>
+        </p:style>
+      </p:cxnSp>
+      <p:cxnSp>
+        <p:nvCxnSpPr>
+          <p:cNvPr id="85" name="Straight Arrow Connector 84">
+            <a:extLst>
+              <a:ext uri="{FF2B5EF4-FFF2-40B4-BE49-F238E27FC236}">
+                <a16:creationId xmlns:a16="http://schemas.microsoft.com/office/drawing/2014/main" id="{EB6B4CFF-A411-E640-A9D3-E9DD33E40DB6}"/>
+              </a:ext>
+            </a:extLst>
+          </p:cNvPr>
+          <p:cNvCxnSpPr>
+            <a:stCxn id="15" idx="3"/>
+            <a:endCxn id="19" idx="1"/>
+          </p:cNvCxnSpPr>
+          <p:nvPr/>
+        </p:nvCxnSpPr>
+        <p:spPr>
+          <a:xfrm flipV="1">
+            <a:off x="6337608" y="3676237"/>
+            <a:ext cx="177489" cy="413992"/>
+          </a:xfrm>
+          <a:prstGeom prst="straightConnector1">
+            <a:avLst/>
+          </a:prstGeom>
+          <a:ln w="19050">
+            <a:solidFill>
+              <a:schemeClr val="tx1"/>
+            </a:solidFill>
+            <a:tailEnd type="triangle"/>
+          </a:ln>
+        </p:spPr>
+        <p:style>
+          <a:lnRef idx="2">
+            <a:schemeClr val="dk1"/>
+          </a:lnRef>
+          <a:fillRef idx="1">
+            <a:schemeClr val="lt1"/>
+          </a:fillRef>
+          <a:effectRef idx="0">
+            <a:schemeClr val="dk1"/>
+          </a:effectRef>
+          <a:fontRef idx="minor">
+            <a:schemeClr val="dk1"/>
+          </a:fontRef>
+        </p:style>
+      </p:cxnSp>
+      <p:cxnSp>
+        <p:nvCxnSpPr>
+          <p:cNvPr id="87" name="Straight Arrow Connector 86">
+            <a:extLst>
+              <a:ext uri="{FF2B5EF4-FFF2-40B4-BE49-F238E27FC236}">
+                <a16:creationId xmlns:a16="http://schemas.microsoft.com/office/drawing/2014/main" id="{4586BE4B-9634-FC44-855E-655D391D5592}"/>
+              </a:ext>
+            </a:extLst>
+          </p:cNvPr>
+          <p:cNvCxnSpPr>
+            <a:cxnSpLocks/>
+            <a:stCxn id="19" idx="3"/>
+            <a:endCxn id="31" idx="2"/>
+          </p:cNvCxnSpPr>
+          <p:nvPr/>
+        </p:nvCxnSpPr>
+        <p:spPr>
+          <a:xfrm>
+            <a:off x="7683188" y="3676237"/>
+            <a:ext cx="369273" cy="2830"/>
+          </a:xfrm>
+          <a:prstGeom prst="straightConnector1">
+            <a:avLst/>
+          </a:prstGeom>
+          <a:ln w="19050">
+            <a:solidFill>
+              <a:schemeClr val="tx1"/>
+            </a:solidFill>
+            <a:tailEnd type="triangle"/>
+          </a:ln>
+        </p:spPr>
+        <p:style>
+          <a:lnRef idx="2">
+            <a:schemeClr val="dk1"/>
+          </a:lnRef>
+          <a:fillRef idx="1">
+            <a:schemeClr val="lt1"/>
+          </a:fillRef>
+          <a:effectRef idx="0">
+            <a:schemeClr val="dk1"/>
+          </a:effectRef>
+          <a:fontRef idx="minor">
+            <a:schemeClr val="dk1"/>
+          </a:fontRef>
+        </p:style>
+      </p:cxnSp>
+      <p:sp>
+        <p:nvSpPr>
+          <p:cNvPr id="2" name="Rectangle 1">
+            <a:extLst>
+              <a:ext uri="{FF2B5EF4-FFF2-40B4-BE49-F238E27FC236}">
+                <a16:creationId xmlns:a16="http://schemas.microsoft.com/office/drawing/2014/main" id="{F80FB0AF-F57B-BF4F-BAEB-FB8251C29C3F}"/>
+              </a:ext>
+            </a:extLst>
+          </p:cNvPr>
+          <p:cNvSpPr/>
+          <p:nvPr/>
+        </p:nvSpPr>
+        <p:spPr>
+          <a:xfrm>
+            <a:off x="3976572" y="4978715"/>
+            <a:ext cx="1416003" cy="662744"/>
+          </a:xfrm>
+          <a:prstGeom prst="rect">
+            <a:avLst/>
+          </a:prstGeom>
+          <a:ln w="19050">
+            <a:solidFill>
+              <a:schemeClr val="tx1"/>
+            </a:solidFill>
+          </a:ln>
+        </p:spPr>
+        <p:style>
+          <a:lnRef idx="2">
+            <a:schemeClr val="dk1"/>
+          </a:lnRef>
+          <a:fillRef idx="1">
+            <a:schemeClr val="lt1"/>
+          </a:fillRef>
+          <a:effectRef idx="0">
+            <a:schemeClr val="dk1"/>
+          </a:effectRef>
+          <a:fontRef idx="minor">
+            <a:schemeClr val="dk1"/>
+          </a:fontRef>
+        </p:style>
+        <p:txBody>
+          <a:bodyPr rtlCol="0" anchor="ctr"/>
+          <a:lstStyle/>
+          <a:p>
+            <a:pPr algn="ctr"/>
+            <a:r>
+              <a:rPr lang="en-US" sz="1100" dirty="0"/>
+              <a:t>Calculate computing time advancement</a:t>
+            </a:r>
+          </a:p>
+        </p:txBody>
+      </p:sp>
+      <p:cxnSp>
+        <p:nvCxnSpPr>
+          <p:cNvPr id="11" name="Straight Arrow Connector 10">
+            <a:extLst>
+              <a:ext uri="{FF2B5EF4-FFF2-40B4-BE49-F238E27FC236}">
+                <a16:creationId xmlns:a16="http://schemas.microsoft.com/office/drawing/2014/main" id="{9E238034-9BD7-0944-990E-5671A8A1C000}"/>
+              </a:ext>
+            </a:extLst>
+          </p:cNvPr>
+          <p:cNvCxnSpPr>
+            <a:stCxn id="20" idx="3"/>
+            <a:endCxn id="2" idx="1"/>
+          </p:cNvCxnSpPr>
+          <p:nvPr/>
+        </p:nvCxnSpPr>
+        <p:spPr>
+          <a:xfrm>
+            <a:off x="3673166" y="5302508"/>
+            <a:ext cx="303406" cy="7579"/>
+          </a:xfrm>
+          <a:prstGeom prst="straightConnector1">
+            <a:avLst/>
+          </a:prstGeom>
+          <a:ln w="19050">
+            <a:solidFill>
+              <a:schemeClr val="tx1"/>
+            </a:solidFill>
+            <a:tailEnd type="triangle"/>
+          </a:ln>
+        </p:spPr>
+        <p:style>
+          <a:lnRef idx="2">
+            <a:schemeClr val="dk1"/>
+          </a:lnRef>
+          <a:fillRef idx="1">
+            <a:schemeClr val="lt1"/>
+          </a:fillRef>
+          <a:effectRef idx="0">
+            <a:schemeClr val="dk1"/>
+          </a:effectRef>
+          <a:fontRef idx="minor">
+            <a:schemeClr val="dk1"/>
+          </a:fontRef>
+        </p:style>
+      </p:cxnSp>
+      <p:sp>
+        <p:nvSpPr>
+          <p:cNvPr id="31" name="Data 30">
+            <a:extLst>
+              <a:ext uri="{FF2B5EF4-FFF2-40B4-BE49-F238E27FC236}">
+                <a16:creationId xmlns:a16="http://schemas.microsoft.com/office/drawing/2014/main" id="{CF085187-D70D-A04D-A007-92EF70654BF8}"/>
+              </a:ext>
+            </a:extLst>
+          </p:cNvPr>
+          <p:cNvSpPr/>
+          <p:nvPr/>
+        </p:nvSpPr>
+        <p:spPr>
+          <a:xfrm>
+            <a:off x="7921082" y="3386091"/>
+            <a:ext cx="1313793" cy="585952"/>
+          </a:xfrm>
+          <a:prstGeom prst="flowChartInputOutput">
+            <a:avLst/>
+          </a:prstGeom>
+          <a:ln w="19050">
+            <a:solidFill>
+              <a:schemeClr val="tx1"/>
+            </a:solidFill>
+          </a:ln>
+        </p:spPr>
+        <p:style>
+          <a:lnRef idx="2">
+            <a:schemeClr val="dk1"/>
+          </a:lnRef>
+          <a:fillRef idx="1">
+            <a:schemeClr val="lt1"/>
+          </a:fillRef>
+          <a:effectRef idx="0">
+            <a:schemeClr val="dk1"/>
+          </a:effectRef>
+          <a:fontRef idx="minor">
+            <a:schemeClr val="dk1"/>
+          </a:fontRef>
+        </p:style>
+        <p:txBody>
+          <a:bodyPr rtlCol="0" anchor="ctr"/>
+          <a:lstStyle/>
+          <a:p>
+            <a:pPr algn="ctr"/>
+            <a:r>
+              <a:rPr lang="en-US" sz="1100" dirty="0"/>
+              <a:t>Save simulation result</a:t>
+            </a:r>
+          </a:p>
+        </p:txBody>
+      </p:sp>
+      <p:sp>
+        <p:nvSpPr>
+          <p:cNvPr id="56" name="Rectangle 55">
+            <a:extLst>
+              <a:ext uri="{FF2B5EF4-FFF2-40B4-BE49-F238E27FC236}">
+                <a16:creationId xmlns:a16="http://schemas.microsoft.com/office/drawing/2014/main" id="{B2DCDA45-31CA-4144-AB0A-646144CF43FC}"/>
+              </a:ext>
+            </a:extLst>
+          </p:cNvPr>
+          <p:cNvSpPr/>
+          <p:nvPr/>
+        </p:nvSpPr>
+        <p:spPr>
+          <a:xfrm>
+            <a:off x="10184268" y="3676237"/>
+            <a:ext cx="1609493" cy="1150094"/>
+          </a:xfrm>
+          <a:prstGeom prst="rect">
+            <a:avLst/>
+          </a:prstGeom>
+          <a:ln w="19050">
+            <a:solidFill>
+              <a:schemeClr val="tx1"/>
+            </a:solidFill>
+          </a:ln>
+        </p:spPr>
+        <p:style>
+          <a:lnRef idx="2">
+            <a:schemeClr val="dk1"/>
+          </a:lnRef>
+          <a:fillRef idx="1">
+            <a:schemeClr val="lt1"/>
+          </a:fillRef>
+          <a:effectRef idx="0">
+            <a:schemeClr val="dk1"/>
+          </a:effectRef>
+          <a:fontRef idx="minor">
+            <a:schemeClr val="dk1"/>
+          </a:fontRef>
+        </p:style>
+        <p:txBody>
+          <a:bodyPr rtlCol="0" anchor="ctr"/>
+          <a:lstStyle/>
+          <a:p>
+            <a:pPr algn="ctr"/>
+            <a:r>
+              <a:rPr lang="en-US" sz="1300" dirty="0"/>
+              <a:t>Calculate difference between GPU and CPU simulation result using MAE </a:t>
+            </a:r>
+          </a:p>
+        </p:txBody>
+      </p:sp>
+      <p:cxnSp>
+        <p:nvCxnSpPr>
+          <p:cNvPr id="35" name="Straight Arrow Connector 34">
+            <a:extLst>
+              <a:ext uri="{FF2B5EF4-FFF2-40B4-BE49-F238E27FC236}">
+                <a16:creationId xmlns:a16="http://schemas.microsoft.com/office/drawing/2014/main" id="{CC644D65-28B7-404F-9F28-972130C36A7B}"/>
+              </a:ext>
+            </a:extLst>
+          </p:cNvPr>
+          <p:cNvCxnSpPr>
+            <a:cxnSpLocks/>
+            <a:stCxn id="22" idx="2"/>
+            <a:endCxn id="56" idx="0"/>
+          </p:cNvCxnSpPr>
+          <p:nvPr/>
+        </p:nvCxnSpPr>
+        <p:spPr>
+          <a:xfrm flipH="1">
+            <a:off x="10989015" y="3419302"/>
+            <a:ext cx="3332" cy="256935"/>
+          </a:xfrm>
+          <a:prstGeom prst="straightConnector1">
+            <a:avLst/>
+          </a:prstGeom>
+          <a:ln w="19050">
+            <a:solidFill>
+              <a:schemeClr val="tx1"/>
+            </a:solidFill>
+            <a:tailEnd type="triangle"/>
+          </a:ln>
+        </p:spPr>
+        <p:style>
+          <a:lnRef idx="2">
+            <a:schemeClr val="dk1"/>
+          </a:lnRef>
+          <a:fillRef idx="1">
+            <a:schemeClr val="lt1"/>
+          </a:fillRef>
+          <a:effectRef idx="0">
+            <a:schemeClr val="dk1"/>
+          </a:effectRef>
+          <a:fontRef idx="minor">
+            <a:schemeClr val="dk1"/>
+          </a:fontRef>
+        </p:style>
+      </p:cxnSp>
+      <p:cxnSp>
+        <p:nvCxnSpPr>
+          <p:cNvPr id="52" name="Straight Arrow Connector 51">
+            <a:extLst>
+              <a:ext uri="{FF2B5EF4-FFF2-40B4-BE49-F238E27FC236}">
+                <a16:creationId xmlns:a16="http://schemas.microsoft.com/office/drawing/2014/main" id="{98750485-3694-B44A-944F-6C5DFEFBB831}"/>
+              </a:ext>
+            </a:extLst>
+          </p:cNvPr>
+          <p:cNvCxnSpPr>
+            <a:cxnSpLocks/>
+            <a:stCxn id="23" idx="3"/>
+            <a:endCxn id="72" idx="1"/>
+          </p:cNvCxnSpPr>
+          <p:nvPr/>
+        </p:nvCxnSpPr>
+        <p:spPr>
+          <a:xfrm flipV="1">
+            <a:off x="8457491" y="5253831"/>
+            <a:ext cx="237201" cy="3618"/>
+          </a:xfrm>
+          <a:prstGeom prst="straightConnector1">
+            <a:avLst/>
+          </a:prstGeom>
+          <a:ln w="19050">
+            <a:solidFill>
+              <a:schemeClr val="tx1"/>
+            </a:solidFill>
+            <a:tailEnd type="triangle"/>
+          </a:ln>
+        </p:spPr>
+        <p:style>
+          <a:lnRef idx="2">
+            <a:schemeClr val="dk1"/>
+          </a:lnRef>
+          <a:fillRef idx="1">
+            <a:schemeClr val="lt1"/>
+          </a:fillRef>
+          <a:effectRef idx="0">
+            <a:schemeClr val="dk1"/>
+          </a:effectRef>
+          <a:fontRef idx="minor">
+            <a:schemeClr val="dk1"/>
+          </a:fontRef>
+        </p:style>
+      </p:cxnSp>
+      <p:cxnSp>
+        <p:nvCxnSpPr>
+          <p:cNvPr id="55" name="Elbow Connector 54">
+            <a:extLst>
+              <a:ext uri="{FF2B5EF4-FFF2-40B4-BE49-F238E27FC236}">
+                <a16:creationId xmlns:a16="http://schemas.microsoft.com/office/drawing/2014/main" id="{7A75F665-AFC8-A44F-91FC-E66F5A2A7983}"/>
+              </a:ext>
+            </a:extLst>
+          </p:cNvPr>
+          <p:cNvCxnSpPr>
+            <a:stCxn id="31" idx="3"/>
+            <a:endCxn id="23" idx="0"/>
+          </p:cNvCxnSpPr>
+          <p:nvPr/>
+        </p:nvCxnSpPr>
+        <p:spPr>
+          <a:xfrm rot="5400000">
+            <a:off x="7570847" y="4053941"/>
+            <a:ext cx="957651" cy="793854"/>
+          </a:xfrm>
+          <a:prstGeom prst="bentConnector3">
+            <a:avLst/>
+          </a:prstGeom>
+          <a:ln w="19050">
+            <a:solidFill>
+              <a:schemeClr val="tx1"/>
+            </a:solidFill>
+            <a:tailEnd type="triangle"/>
+          </a:ln>
+        </p:spPr>
+        <p:style>
+          <a:lnRef idx="2">
+            <a:schemeClr val="dk1"/>
+          </a:lnRef>
+          <a:fillRef idx="1">
+            <a:schemeClr val="lt1"/>
+          </a:fillRef>
+          <a:effectRef idx="0">
+            <a:schemeClr val="dk1"/>
+          </a:effectRef>
+          <a:fontRef idx="minor">
+            <a:schemeClr val="dk1"/>
+          </a:fontRef>
+        </p:style>
+      </p:cxnSp>
+      <p:sp>
+        <p:nvSpPr>
+          <p:cNvPr id="72" name="Rectangle 71">
+            <a:extLst>
+              <a:ext uri="{FF2B5EF4-FFF2-40B4-BE49-F238E27FC236}">
+                <a16:creationId xmlns:a16="http://schemas.microsoft.com/office/drawing/2014/main" id="{BDF9081E-92A6-2440-A125-A3CD1BF529F8}"/>
+              </a:ext>
+            </a:extLst>
+          </p:cNvPr>
+          <p:cNvSpPr/>
+          <p:nvPr/>
+        </p:nvSpPr>
+        <p:spPr>
+          <a:xfrm>
+            <a:off x="8694692" y="4922459"/>
+            <a:ext cx="1752590" cy="662744"/>
+          </a:xfrm>
+          <a:prstGeom prst="rect">
+            <a:avLst/>
+          </a:prstGeom>
+          <a:ln w="19050">
+            <a:solidFill>
+              <a:schemeClr val="tx1"/>
+            </a:solidFill>
+          </a:ln>
+        </p:spPr>
+        <p:style>
+          <a:lnRef idx="2">
+            <a:schemeClr val="dk1"/>
+          </a:lnRef>
+          <a:fillRef idx="1">
+            <a:schemeClr val="lt1"/>
+          </a:fillRef>
+          <a:effectRef idx="0">
+            <a:schemeClr val="dk1"/>
+          </a:effectRef>
+          <a:fontRef idx="minor">
+            <a:schemeClr val="dk1"/>
+          </a:fontRef>
+        </p:style>
+        <p:txBody>
+          <a:bodyPr rtlCol="0" anchor="ctr"/>
+          <a:lstStyle/>
+          <a:p>
+            <a:pPr algn="ctr"/>
+            <a:r>
+              <a:rPr lang="en-US" sz="1100" dirty="0"/>
+              <a:t>Compare action potential shape in different concentrations</a:t>
+            </a:r>
+          </a:p>
+        </p:txBody>
+      </p:sp>
+      <p:sp>
+        <p:nvSpPr>
+          <p:cNvPr id="78" name="Rectangle 77">
+            <a:extLst>
+              <a:ext uri="{FF2B5EF4-FFF2-40B4-BE49-F238E27FC236}">
+                <a16:creationId xmlns:a16="http://schemas.microsoft.com/office/drawing/2014/main" id="{BE78EA5C-6161-3645-8C70-09DC1C4C3196}"/>
+              </a:ext>
+            </a:extLst>
+          </p:cNvPr>
+          <p:cNvSpPr/>
+          <p:nvPr/>
+        </p:nvSpPr>
+        <p:spPr>
+          <a:xfrm>
+            <a:off x="544550" y="2786929"/>
+            <a:ext cx="9333571" cy="1957080"/>
+          </a:xfrm>
+          <a:prstGeom prst="rect">
+            <a:avLst/>
+          </a:prstGeom>
+          <a:noFill/>
+          <a:ln w="12700">
+            <a:solidFill>
+              <a:schemeClr val="tx1"/>
+            </a:solidFill>
+            <a:prstDash val="dash"/>
+          </a:ln>
         </p:spPr>
         <p:style>
           <a:lnRef idx="2">
@@ -5219,754 +6200,10 @@
           <a:lstStyle/>
           <a:p>
             <a:pPr algn="ctr"/>
-            <a:r>
-              <a:rPr lang="en-US" sz="1200" dirty="0"/>
-              <a:t>Simulation Validation</a:t>
-            </a:r>
-          </a:p>
-        </p:txBody>
-      </p:sp>
-      <p:sp>
-        <p:nvSpPr>
-          <p:cNvPr id="46" name="Rectangle 45">
-            <a:extLst>
-              <a:ext uri="{FF2B5EF4-FFF2-40B4-BE49-F238E27FC236}">
-                <a16:creationId xmlns:a16="http://schemas.microsoft.com/office/drawing/2014/main" id="{762E5292-7126-B745-8D56-FA0CF9E78176}"/>
-              </a:ext>
-            </a:extLst>
-          </p:cNvPr>
-          <p:cNvSpPr/>
-          <p:nvPr/>
-        </p:nvSpPr>
-        <p:spPr>
-          <a:xfrm>
-            <a:off x="5226205" y="2315508"/>
-            <a:ext cx="4651917" cy="172400"/>
-          </a:xfrm>
-          <a:prstGeom prst="rect">
-            <a:avLst/>
-          </a:prstGeom>
-        </p:spPr>
-        <p:style>
-          <a:lnRef idx="2">
-            <a:schemeClr val="accent1">
-              <a:shade val="50000"/>
-            </a:schemeClr>
-          </a:lnRef>
-          <a:fillRef idx="1">
-            <a:schemeClr val="accent1"/>
-          </a:fillRef>
-          <a:effectRef idx="0">
-            <a:schemeClr val="accent1"/>
-          </a:effectRef>
-          <a:fontRef idx="minor">
-            <a:schemeClr val="lt1"/>
-          </a:fontRef>
-        </p:style>
-        <p:txBody>
-          <a:bodyPr rtlCol="0" anchor="ctr"/>
-          <a:lstStyle/>
-          <a:p>
-            <a:pPr algn="ctr"/>
-            <a:r>
-              <a:rPr lang="en-US" sz="1200" dirty="0"/>
-              <a:t>Drug-free</a:t>
-            </a:r>
-          </a:p>
-        </p:txBody>
-      </p:sp>
-      <p:sp>
-        <p:nvSpPr>
-          <p:cNvPr id="47" name="Rectangle 46">
-            <a:extLst>
-              <a:ext uri="{FF2B5EF4-FFF2-40B4-BE49-F238E27FC236}">
-                <a16:creationId xmlns:a16="http://schemas.microsoft.com/office/drawing/2014/main" id="{1296B7A6-D52A-0245-9222-842DFAD6DF8D}"/>
-              </a:ext>
-            </a:extLst>
-          </p:cNvPr>
-          <p:cNvSpPr/>
-          <p:nvPr/>
-        </p:nvSpPr>
-        <p:spPr>
-          <a:xfrm>
-            <a:off x="555702" y="2315508"/>
-            <a:ext cx="4651917" cy="172400"/>
-          </a:xfrm>
-          <a:prstGeom prst="rect">
-            <a:avLst/>
-          </a:prstGeom>
-        </p:spPr>
-        <p:style>
-          <a:lnRef idx="2">
-            <a:schemeClr val="accent1">
-              <a:shade val="50000"/>
-            </a:schemeClr>
-          </a:lnRef>
-          <a:fillRef idx="1">
-            <a:schemeClr val="accent1"/>
-          </a:fillRef>
-          <a:effectRef idx="0">
-            <a:schemeClr val="accent1"/>
-          </a:effectRef>
-          <a:fontRef idx="minor">
-            <a:schemeClr val="lt1"/>
-          </a:fontRef>
-        </p:style>
-        <p:txBody>
-          <a:bodyPr rtlCol="0" anchor="ctr"/>
-          <a:lstStyle/>
-          <a:p>
-            <a:pPr algn="ctr"/>
-            <a:r>
-              <a:rPr lang="en-US" sz="1200" dirty="0"/>
-              <a:t>Under-drug</a:t>
-            </a:r>
-          </a:p>
-        </p:txBody>
-      </p:sp>
-      <p:sp>
-        <p:nvSpPr>
-          <p:cNvPr id="48" name="Rectangle 47">
-            <a:extLst>
-              <a:ext uri="{FF2B5EF4-FFF2-40B4-BE49-F238E27FC236}">
-                <a16:creationId xmlns:a16="http://schemas.microsoft.com/office/drawing/2014/main" id="{9A52BC2D-927F-0141-AB72-6B0FB13DCC1B}"/>
-              </a:ext>
-            </a:extLst>
-          </p:cNvPr>
-          <p:cNvSpPr/>
-          <p:nvPr/>
-        </p:nvSpPr>
-        <p:spPr>
-          <a:xfrm>
-            <a:off x="544551" y="2502214"/>
-            <a:ext cx="4651917" cy="172400"/>
-          </a:xfrm>
-          <a:prstGeom prst="rect">
-            <a:avLst/>
-          </a:prstGeom>
-        </p:spPr>
-        <p:style>
-          <a:lnRef idx="2">
-            <a:schemeClr val="accent1">
-              <a:shade val="50000"/>
-            </a:schemeClr>
-          </a:lnRef>
-          <a:fillRef idx="1">
-            <a:schemeClr val="accent1"/>
-          </a:fillRef>
-          <a:effectRef idx="0">
-            <a:schemeClr val="accent1"/>
-          </a:effectRef>
-          <a:fontRef idx="minor">
-            <a:schemeClr val="lt1"/>
-          </a:fontRef>
-        </p:style>
-        <p:txBody>
-          <a:bodyPr rtlCol="0" anchor="ctr"/>
-          <a:lstStyle/>
-          <a:p>
-            <a:pPr algn="ctr"/>
-            <a:r>
-              <a:rPr lang="en-US" sz="1100" dirty="0"/>
-              <a:t>Drug: bepridil (33, 66, 132 mMol)</a:t>
-            </a:r>
-          </a:p>
-        </p:txBody>
-      </p:sp>
-      <p:sp>
-        <p:nvSpPr>
-          <p:cNvPr id="49" name="Rectangle 48">
-            <a:extLst>
-              <a:ext uri="{FF2B5EF4-FFF2-40B4-BE49-F238E27FC236}">
-                <a16:creationId xmlns:a16="http://schemas.microsoft.com/office/drawing/2014/main" id="{031884BE-93B3-4245-8CAE-67DDFC1E3B3E}"/>
-              </a:ext>
-            </a:extLst>
-          </p:cNvPr>
-          <p:cNvSpPr/>
-          <p:nvPr/>
-        </p:nvSpPr>
-        <p:spPr>
-          <a:xfrm>
-            <a:off x="5226204" y="2509427"/>
-            <a:ext cx="4651917" cy="172400"/>
-          </a:xfrm>
-          <a:prstGeom prst="rect">
-            <a:avLst/>
-          </a:prstGeom>
-        </p:spPr>
-        <p:style>
-          <a:lnRef idx="2">
-            <a:schemeClr val="accent1">
-              <a:shade val="50000"/>
-            </a:schemeClr>
-          </a:lnRef>
-          <a:fillRef idx="1">
-            <a:schemeClr val="accent1"/>
-          </a:fillRef>
-          <a:effectRef idx="0">
-            <a:schemeClr val="accent1"/>
-          </a:effectRef>
-          <a:fontRef idx="minor">
-            <a:schemeClr val="lt1"/>
-          </a:fontRef>
-        </p:style>
-        <p:txBody>
-          <a:bodyPr rtlCol="0" anchor="ctr"/>
-          <a:lstStyle/>
-          <a:p>
-            <a:pPr algn="ctr"/>
-            <a:r>
-              <a:rPr lang="en-US" sz="1100" dirty="0"/>
-              <a:t>Concentration: 0 mMol</a:t>
-            </a:r>
-          </a:p>
-        </p:txBody>
-      </p:sp>
-      <p:sp>
-        <p:nvSpPr>
-          <p:cNvPr id="50" name="Rectangle 49">
-            <a:extLst>
-              <a:ext uri="{FF2B5EF4-FFF2-40B4-BE49-F238E27FC236}">
-                <a16:creationId xmlns:a16="http://schemas.microsoft.com/office/drawing/2014/main" id="{B4C3FFF0-D3C6-6B44-BD8E-E97477183C19}"/>
-              </a:ext>
-            </a:extLst>
-          </p:cNvPr>
-          <p:cNvSpPr/>
-          <p:nvPr/>
-        </p:nvSpPr>
-        <p:spPr>
-          <a:xfrm>
-            <a:off x="544550" y="2681827"/>
-            <a:ext cx="9333571" cy="1957080"/>
-          </a:xfrm>
-          <a:prstGeom prst="rect">
-            <a:avLst/>
-          </a:prstGeom>
-          <a:noFill/>
-          <a:ln>
-            <a:prstDash val="dash"/>
-          </a:ln>
-        </p:spPr>
-        <p:style>
-          <a:lnRef idx="2">
-            <a:schemeClr val="accent1">
-              <a:shade val="50000"/>
-            </a:schemeClr>
-          </a:lnRef>
-          <a:fillRef idx="1">
-            <a:schemeClr val="accent1"/>
-          </a:fillRef>
-          <a:effectRef idx="0">
-            <a:schemeClr val="accent1"/>
-          </a:effectRef>
-          <a:fontRef idx="minor">
-            <a:schemeClr val="lt1"/>
-          </a:fontRef>
-        </p:style>
-        <p:txBody>
-          <a:bodyPr rtlCol="0" anchor="ctr"/>
-          <a:lstStyle/>
-          <a:p>
-            <a:pPr algn="ctr"/>
-            <a:endParaRPr lang="en-US"/>
-          </a:p>
-        </p:txBody>
-      </p:sp>
-      <p:cxnSp>
-        <p:nvCxnSpPr>
-          <p:cNvPr id="60" name="Elbow Connector 59">
-            <a:extLst>
-              <a:ext uri="{FF2B5EF4-FFF2-40B4-BE49-F238E27FC236}">
-                <a16:creationId xmlns:a16="http://schemas.microsoft.com/office/drawing/2014/main" id="{034FC4A2-54C3-EA4A-A713-1E9C3C3F8CB2}"/>
-              </a:ext>
-            </a:extLst>
-          </p:cNvPr>
-          <p:cNvCxnSpPr>
-            <a:stCxn id="19" idx="2"/>
-          </p:cNvCxnSpPr>
-          <p:nvPr/>
-        </p:nvCxnSpPr>
-        <p:spPr>
-          <a:xfrm rot="5400000">
-            <a:off x="4806386" y="2446510"/>
-            <a:ext cx="906079" cy="3679437"/>
-          </a:xfrm>
-          <a:prstGeom prst="bentConnector2">
-            <a:avLst/>
-          </a:prstGeom>
-          <a:ln w="12700"/>
-        </p:spPr>
-        <p:style>
-          <a:lnRef idx="1">
-            <a:schemeClr val="accent1"/>
-          </a:lnRef>
-          <a:fillRef idx="0">
-            <a:schemeClr val="accent1"/>
-          </a:fillRef>
-          <a:effectRef idx="0">
-            <a:schemeClr val="accent1"/>
-          </a:effectRef>
-          <a:fontRef idx="minor">
-            <a:schemeClr val="tx1"/>
-          </a:fontRef>
-        </p:style>
-      </p:cxnSp>
-      <p:cxnSp>
-        <p:nvCxnSpPr>
-          <p:cNvPr id="62" name="Elbow Connector 61">
-            <a:extLst>
-              <a:ext uri="{FF2B5EF4-FFF2-40B4-BE49-F238E27FC236}">
-                <a16:creationId xmlns:a16="http://schemas.microsoft.com/office/drawing/2014/main" id="{4A82A34B-C86F-FA40-BDD3-B490BBCF888E}"/>
-              </a:ext>
-            </a:extLst>
-          </p:cNvPr>
-          <p:cNvCxnSpPr>
-            <a:endCxn id="20" idx="0"/>
-          </p:cNvCxnSpPr>
-          <p:nvPr/>
-        </p:nvCxnSpPr>
-        <p:spPr>
-          <a:xfrm rot="10800000" flipV="1">
-            <a:off x="3419707" y="4739268"/>
-            <a:ext cx="804746" cy="132774"/>
-          </a:xfrm>
-          <a:prstGeom prst="bentConnector2">
-            <a:avLst/>
-          </a:prstGeom>
-          <a:ln>
-            <a:tailEnd type="triangle"/>
-          </a:ln>
-        </p:spPr>
-        <p:style>
-          <a:lnRef idx="1">
-            <a:schemeClr val="accent1"/>
-          </a:lnRef>
-          <a:fillRef idx="0">
-            <a:schemeClr val="accent1"/>
-          </a:fillRef>
-          <a:effectRef idx="0">
-            <a:schemeClr val="accent1"/>
-          </a:effectRef>
-          <a:fontRef idx="minor">
-            <a:schemeClr val="tx1"/>
-          </a:fontRef>
-        </p:style>
-      </p:cxnSp>
-      <p:cxnSp>
-        <p:nvCxnSpPr>
-          <p:cNvPr id="66" name="Elbow Connector 65">
-            <a:extLst>
-              <a:ext uri="{FF2B5EF4-FFF2-40B4-BE49-F238E27FC236}">
-                <a16:creationId xmlns:a16="http://schemas.microsoft.com/office/drawing/2014/main" id="{B8047402-C816-5943-9309-24433E13769D}"/>
-              </a:ext>
-            </a:extLst>
-          </p:cNvPr>
-          <p:cNvCxnSpPr>
-            <a:cxnSpLocks/>
-          </p:cNvCxnSpPr>
-          <p:nvPr/>
-        </p:nvCxnSpPr>
-        <p:spPr>
-          <a:xfrm rot="5400000">
-            <a:off x="8214766" y="3835211"/>
-            <a:ext cx="680152" cy="695094"/>
-          </a:xfrm>
-          <a:prstGeom prst="bentConnector2">
-            <a:avLst/>
-          </a:prstGeom>
-          <a:ln w="12700"/>
-        </p:spPr>
-        <p:style>
-          <a:lnRef idx="1">
-            <a:schemeClr val="accent1"/>
-          </a:lnRef>
-          <a:fillRef idx="0">
-            <a:schemeClr val="accent1"/>
-          </a:fillRef>
-          <a:effectRef idx="0">
-            <a:schemeClr val="accent1"/>
-          </a:effectRef>
-          <a:fontRef idx="minor">
-            <a:schemeClr val="tx1"/>
-          </a:fontRef>
-        </p:style>
-      </p:cxnSp>
-      <p:cxnSp>
-        <p:nvCxnSpPr>
-          <p:cNvPr id="71" name="Elbow Connector 70">
-            <a:extLst>
-              <a:ext uri="{FF2B5EF4-FFF2-40B4-BE49-F238E27FC236}">
-                <a16:creationId xmlns:a16="http://schemas.microsoft.com/office/drawing/2014/main" id="{4020AF62-16A6-484B-B867-463421CDCD98}"/>
-              </a:ext>
-            </a:extLst>
-          </p:cNvPr>
-          <p:cNvCxnSpPr>
-            <a:endCxn id="22" idx="0"/>
-          </p:cNvCxnSpPr>
-          <p:nvPr/>
-        </p:nvCxnSpPr>
-        <p:spPr>
-          <a:xfrm rot="10800000" flipV="1">
-            <a:off x="7402551" y="4522833"/>
-            <a:ext cx="804745" cy="358015"/>
-          </a:xfrm>
-          <a:prstGeom prst="bentConnector2">
-            <a:avLst/>
-          </a:prstGeom>
-          <a:ln>
-            <a:tailEnd type="triangle"/>
-          </a:ln>
-        </p:spPr>
-        <p:style>
-          <a:lnRef idx="1">
-            <a:schemeClr val="accent1"/>
-          </a:lnRef>
-          <a:fillRef idx="0">
-            <a:schemeClr val="accent1"/>
-          </a:fillRef>
-          <a:effectRef idx="0">
-            <a:schemeClr val="accent1"/>
-          </a:effectRef>
-          <a:fontRef idx="minor">
-            <a:schemeClr val="tx1"/>
-          </a:fontRef>
-        </p:style>
-      </p:cxnSp>
-      <p:cxnSp>
-        <p:nvCxnSpPr>
-          <p:cNvPr id="73" name="Elbow Connector 72">
-            <a:extLst>
-              <a:ext uri="{FF2B5EF4-FFF2-40B4-BE49-F238E27FC236}">
-                <a16:creationId xmlns:a16="http://schemas.microsoft.com/office/drawing/2014/main" id="{B53F84B6-B611-F54E-A09C-0C5FE2510E8D}"/>
-              </a:ext>
-            </a:extLst>
-          </p:cNvPr>
-          <p:cNvCxnSpPr>
-            <a:endCxn id="23" idx="0"/>
-          </p:cNvCxnSpPr>
-          <p:nvPr/>
-        </p:nvCxnSpPr>
-        <p:spPr>
-          <a:xfrm>
-            <a:off x="8201719" y="4517936"/>
-            <a:ext cx="871656" cy="362912"/>
-          </a:xfrm>
-          <a:prstGeom prst="bentConnector2">
-            <a:avLst/>
-          </a:prstGeom>
-          <a:ln>
-            <a:tailEnd type="triangle"/>
-          </a:ln>
-        </p:spPr>
-        <p:style>
-          <a:lnRef idx="1">
-            <a:schemeClr val="accent1"/>
-          </a:lnRef>
-          <a:fillRef idx="0">
-            <a:schemeClr val="accent1"/>
-          </a:fillRef>
-          <a:effectRef idx="0">
-            <a:schemeClr val="accent1"/>
-          </a:effectRef>
-          <a:fontRef idx="minor">
-            <a:schemeClr val="tx1"/>
-          </a:fontRef>
-        </p:style>
-      </p:cxnSp>
-      <p:cxnSp>
-        <p:nvCxnSpPr>
-          <p:cNvPr id="75" name="Straight Arrow Connector 74">
-            <a:extLst>
-              <a:ext uri="{FF2B5EF4-FFF2-40B4-BE49-F238E27FC236}">
-                <a16:creationId xmlns:a16="http://schemas.microsoft.com/office/drawing/2014/main" id="{35BF0DF6-21DF-A541-B70E-256A04DA182B}"/>
-              </a:ext>
-            </a:extLst>
-          </p:cNvPr>
-          <p:cNvCxnSpPr>
-            <a:stCxn id="12" idx="3"/>
-            <a:endCxn id="16" idx="1"/>
-          </p:cNvCxnSpPr>
-          <p:nvPr/>
-        </p:nvCxnSpPr>
-        <p:spPr>
-          <a:xfrm>
-            <a:off x="2289717" y="3157146"/>
-            <a:ext cx="314092" cy="0"/>
-          </a:xfrm>
-          <a:prstGeom prst="straightConnector1">
-            <a:avLst/>
-          </a:prstGeom>
-          <a:ln>
-            <a:tailEnd type="triangle"/>
-          </a:ln>
-        </p:spPr>
-        <p:style>
-          <a:lnRef idx="1">
-            <a:schemeClr val="accent1"/>
-          </a:lnRef>
-          <a:fillRef idx="0">
-            <a:schemeClr val="accent1"/>
-          </a:fillRef>
-          <a:effectRef idx="0">
-            <a:schemeClr val="accent1"/>
-          </a:effectRef>
-          <a:fontRef idx="minor">
-            <a:schemeClr val="tx1"/>
-          </a:fontRef>
-        </p:style>
-      </p:cxnSp>
-      <p:cxnSp>
-        <p:nvCxnSpPr>
-          <p:cNvPr id="77" name="Straight Arrow Connector 76">
-            <a:extLst>
-              <a:ext uri="{FF2B5EF4-FFF2-40B4-BE49-F238E27FC236}">
-                <a16:creationId xmlns:a16="http://schemas.microsoft.com/office/drawing/2014/main" id="{BD75DCF0-96A7-F24E-B515-6E01D3C22184}"/>
-              </a:ext>
-            </a:extLst>
-          </p:cNvPr>
-          <p:cNvCxnSpPr>
-            <a:stCxn id="13" idx="3"/>
-            <a:endCxn id="17" idx="1"/>
-          </p:cNvCxnSpPr>
-          <p:nvPr/>
-        </p:nvCxnSpPr>
-        <p:spPr>
-          <a:xfrm>
-            <a:off x="2300868" y="3985127"/>
-            <a:ext cx="314092" cy="11151"/>
-          </a:xfrm>
-          <a:prstGeom prst="straightConnector1">
-            <a:avLst/>
-          </a:prstGeom>
-          <a:ln>
-            <a:tailEnd type="triangle"/>
-          </a:ln>
-        </p:spPr>
-        <p:style>
-          <a:lnRef idx="1">
-            <a:schemeClr val="accent1"/>
-          </a:lnRef>
-          <a:fillRef idx="0">
-            <a:schemeClr val="accent1"/>
-          </a:fillRef>
-          <a:effectRef idx="0">
-            <a:schemeClr val="accent1"/>
-          </a:effectRef>
-          <a:fontRef idx="minor">
-            <a:schemeClr val="tx1"/>
-          </a:fontRef>
-        </p:style>
-      </p:cxnSp>
-      <p:cxnSp>
-        <p:nvCxnSpPr>
-          <p:cNvPr id="79" name="Straight Arrow Connector 78">
-            <a:extLst>
-              <a:ext uri="{FF2B5EF4-FFF2-40B4-BE49-F238E27FC236}">
-                <a16:creationId xmlns:a16="http://schemas.microsoft.com/office/drawing/2014/main" id="{12D3ECA4-DC8B-1E4E-ADD6-101EF4882937}"/>
-              </a:ext>
-            </a:extLst>
-          </p:cNvPr>
-          <p:cNvCxnSpPr>
-            <a:stCxn id="16" idx="3"/>
-            <a:endCxn id="14" idx="1"/>
-          </p:cNvCxnSpPr>
-          <p:nvPr/>
-        </p:nvCxnSpPr>
-        <p:spPr>
-          <a:xfrm>
-            <a:off x="4313662" y="3157146"/>
-            <a:ext cx="302942" cy="0"/>
-          </a:xfrm>
-          <a:prstGeom prst="straightConnector1">
-            <a:avLst/>
-          </a:prstGeom>
-          <a:ln>
-            <a:tailEnd type="triangle"/>
-          </a:ln>
-        </p:spPr>
-        <p:style>
-          <a:lnRef idx="1">
-            <a:schemeClr val="accent1"/>
-          </a:lnRef>
-          <a:fillRef idx="0">
-            <a:schemeClr val="accent1"/>
-          </a:fillRef>
-          <a:effectRef idx="0">
-            <a:schemeClr val="accent1"/>
-          </a:effectRef>
-          <a:fontRef idx="minor">
-            <a:schemeClr val="tx1"/>
-          </a:fontRef>
-        </p:style>
-      </p:cxnSp>
-      <p:cxnSp>
-        <p:nvCxnSpPr>
-          <p:cNvPr id="81" name="Straight Arrow Connector 80">
-            <a:extLst>
-              <a:ext uri="{FF2B5EF4-FFF2-40B4-BE49-F238E27FC236}">
-                <a16:creationId xmlns:a16="http://schemas.microsoft.com/office/drawing/2014/main" id="{CAE469AC-7C32-6C49-AB5E-7AFA0721830F}"/>
-              </a:ext>
-            </a:extLst>
-          </p:cNvPr>
-          <p:cNvCxnSpPr>
-            <a:stCxn id="17" idx="3"/>
-            <a:endCxn id="15" idx="1"/>
-          </p:cNvCxnSpPr>
-          <p:nvPr/>
-        </p:nvCxnSpPr>
-        <p:spPr>
-          <a:xfrm flipV="1">
-            <a:off x="4324813" y="3985127"/>
-            <a:ext cx="302942" cy="11151"/>
-          </a:xfrm>
-          <a:prstGeom prst="straightConnector1">
-            <a:avLst/>
-          </a:prstGeom>
-          <a:ln>
-            <a:tailEnd type="triangle"/>
-          </a:ln>
-        </p:spPr>
-        <p:style>
-          <a:lnRef idx="1">
-            <a:schemeClr val="accent1"/>
-          </a:lnRef>
-          <a:fillRef idx="0">
-            <a:schemeClr val="accent1"/>
-          </a:fillRef>
-          <a:effectRef idx="0">
-            <a:schemeClr val="accent1"/>
-          </a:effectRef>
-          <a:fontRef idx="minor">
-            <a:schemeClr val="tx1"/>
-          </a:fontRef>
-        </p:style>
-      </p:cxnSp>
-      <p:cxnSp>
-        <p:nvCxnSpPr>
-          <p:cNvPr id="83" name="Straight Arrow Connector 82">
-            <a:extLst>
-              <a:ext uri="{FF2B5EF4-FFF2-40B4-BE49-F238E27FC236}">
-                <a16:creationId xmlns:a16="http://schemas.microsoft.com/office/drawing/2014/main" id="{5E2D6F59-ECC3-CD4F-BA3F-FD3ADCD5FFFC}"/>
-              </a:ext>
-            </a:extLst>
-          </p:cNvPr>
-          <p:cNvCxnSpPr>
-            <a:stCxn id="14" idx="3"/>
-            <a:endCxn id="19" idx="1"/>
-          </p:cNvCxnSpPr>
-          <p:nvPr/>
-        </p:nvCxnSpPr>
-        <p:spPr>
-          <a:xfrm>
-            <a:off x="6326457" y="3157146"/>
-            <a:ext cx="188640" cy="413989"/>
-          </a:xfrm>
-          <a:prstGeom prst="straightConnector1">
-            <a:avLst/>
-          </a:prstGeom>
-          <a:ln>
-            <a:tailEnd type="triangle"/>
-          </a:ln>
-        </p:spPr>
-        <p:style>
-          <a:lnRef idx="1">
-            <a:schemeClr val="accent1"/>
-          </a:lnRef>
-          <a:fillRef idx="0">
-            <a:schemeClr val="accent1"/>
-          </a:fillRef>
-          <a:effectRef idx="0">
-            <a:schemeClr val="accent1"/>
-          </a:effectRef>
-          <a:fontRef idx="minor">
-            <a:schemeClr val="tx1"/>
-          </a:fontRef>
-        </p:style>
-      </p:cxnSp>
-      <p:cxnSp>
-        <p:nvCxnSpPr>
-          <p:cNvPr id="85" name="Straight Arrow Connector 84">
-            <a:extLst>
-              <a:ext uri="{FF2B5EF4-FFF2-40B4-BE49-F238E27FC236}">
-                <a16:creationId xmlns:a16="http://schemas.microsoft.com/office/drawing/2014/main" id="{EB6B4CFF-A411-E640-A9D3-E9DD33E40DB6}"/>
-              </a:ext>
-            </a:extLst>
-          </p:cNvPr>
-          <p:cNvCxnSpPr>
-            <a:stCxn id="15" idx="3"/>
-            <a:endCxn id="19" idx="1"/>
-          </p:cNvCxnSpPr>
-          <p:nvPr/>
-        </p:nvCxnSpPr>
-        <p:spPr>
-          <a:xfrm flipV="1">
-            <a:off x="6337608" y="3571135"/>
-            <a:ext cx="177489" cy="413992"/>
-          </a:xfrm>
-          <a:prstGeom prst="straightConnector1">
-            <a:avLst/>
-          </a:prstGeom>
-          <a:ln>
-            <a:tailEnd type="triangle"/>
-          </a:ln>
-        </p:spPr>
-        <p:style>
-          <a:lnRef idx="1">
-            <a:schemeClr val="accent1"/>
-          </a:lnRef>
-          <a:fillRef idx="0">
-            <a:schemeClr val="accent1"/>
-          </a:fillRef>
-          <a:effectRef idx="0">
-            <a:schemeClr val="accent1"/>
-          </a:effectRef>
-          <a:fontRef idx="minor">
-            <a:schemeClr val="tx1"/>
-          </a:fontRef>
-        </p:style>
-      </p:cxnSp>
-      <p:cxnSp>
-        <p:nvCxnSpPr>
-          <p:cNvPr id="87" name="Straight Arrow Connector 86">
-            <a:extLst>
-              <a:ext uri="{FF2B5EF4-FFF2-40B4-BE49-F238E27FC236}">
-                <a16:creationId xmlns:a16="http://schemas.microsoft.com/office/drawing/2014/main" id="{4586BE4B-9634-FC44-855E-655D391D5592}"/>
-              </a:ext>
-            </a:extLst>
-          </p:cNvPr>
-          <p:cNvCxnSpPr>
-            <a:stCxn id="19" idx="3"/>
-            <a:endCxn id="18" idx="1"/>
-          </p:cNvCxnSpPr>
-          <p:nvPr/>
-        </p:nvCxnSpPr>
-        <p:spPr>
-          <a:xfrm>
-            <a:off x="7683188" y="3571135"/>
-            <a:ext cx="237894" cy="13938"/>
-          </a:xfrm>
-          <a:prstGeom prst="straightConnector1">
-            <a:avLst/>
-          </a:prstGeom>
-          <a:ln>
-            <a:tailEnd type="triangle"/>
-          </a:ln>
-        </p:spPr>
-        <p:style>
-          <a:lnRef idx="1">
-            <a:schemeClr val="accent1"/>
-          </a:lnRef>
-          <a:fillRef idx="0">
-            <a:schemeClr val="accent1"/>
-          </a:fillRef>
-          <a:effectRef idx="0">
-            <a:schemeClr val="accent1"/>
-          </a:effectRef>
-          <a:fontRef idx="minor">
-            <a:schemeClr val="tx1"/>
-          </a:fontRef>
-        </p:style>
-      </p:cxnSp>
+            <a:endParaRPr lang="en-US" dirty="0"/>
+          </a:p>
+        </p:txBody>
+      </p:sp>
     </p:spTree>
     <p:extLst>
       <p:ext uri="{BB962C8B-B14F-4D97-AF65-F5344CB8AC3E}">

</xml_diff>